<commit_message>
arreglo de nombres de ficheros
</commit_message>
<xml_diff>
--- a/ppt/04 Cómo son los programas.pptx
+++ b/ppt/04 Cómo son los programas.pptx
@@ -7,15 +7,16 @@
   <p:sldIdLst>
     <p:sldId id="256" r:id="rId2"/>
     <p:sldId id="257" r:id="rId3"/>
-    <p:sldId id="258" r:id="rId4"/>
-    <p:sldId id="262" r:id="rId5"/>
-    <p:sldId id="259" r:id="rId6"/>
-    <p:sldId id="260" r:id="rId7"/>
-    <p:sldId id="261" r:id="rId8"/>
-    <p:sldId id="264" r:id="rId9"/>
-    <p:sldId id="265" r:id="rId10"/>
-    <p:sldId id="266" r:id="rId11"/>
-    <p:sldId id="267" r:id="rId12"/>
+    <p:sldId id="268" r:id="rId4"/>
+    <p:sldId id="258" r:id="rId5"/>
+    <p:sldId id="262" r:id="rId6"/>
+    <p:sldId id="259" r:id="rId7"/>
+    <p:sldId id="260" r:id="rId8"/>
+    <p:sldId id="261" r:id="rId9"/>
+    <p:sldId id="264" r:id="rId10"/>
+    <p:sldId id="265" r:id="rId11"/>
+    <p:sldId id="266" r:id="rId12"/>
+    <p:sldId id="267" r:id="rId13"/>
   </p:sldIdLst>
   <p:sldSz cx="12192000" cy="6858000"/>
   <p:notesSz cx="6858000" cy="9144000"/>
@@ -114,6 +115,11 @@
       </a:defRPr>
     </a:lvl9pPr>
   </p:defaultTextStyle>
+  <p:extLst>
+    <p:ext uri="{EFAFB233-063F-42B5-8137-9DF3F51BA10A}">
+      <p15:sldGuideLst xmlns:p15="http://schemas.microsoft.com/office/powerpoint/2012/main"/>
+    </p:ext>
+  </p:extLst>
 </p:presentation>
 </file>
 
@@ -2346,7 +2352,7 @@
           <a:p>
             <a:fld id="{D115692F-CE3A-4135-A072-A00A9E0CD8F4}" type="datetimeFigureOut">
               <a:rPr lang="es-ES" smtClean="0"/>
-              <a:t>01/04/2019</a:t>
+              <a:t>03/04/2019</a:t>
             </a:fld>
             <a:endParaRPr lang="es-ES"/>
           </a:p>
@@ -2597,7 +2603,7 @@
           <a:p>
             <a:fld id="{D115692F-CE3A-4135-A072-A00A9E0CD8F4}" type="datetimeFigureOut">
               <a:rPr lang="es-ES" smtClean="0"/>
-              <a:t>01/04/2019</a:t>
+              <a:t>03/04/2019</a:t>
             </a:fld>
             <a:endParaRPr lang="es-ES"/>
           </a:p>
@@ -2911,7 +2917,7 @@
           <a:p>
             <a:fld id="{D115692F-CE3A-4135-A072-A00A9E0CD8F4}" type="datetimeFigureOut">
               <a:rPr lang="es-ES" smtClean="0"/>
-              <a:t>01/04/2019</a:t>
+              <a:t>03/04/2019</a:t>
             </a:fld>
             <a:endParaRPr lang="es-ES"/>
           </a:p>
@@ -3252,7 +3258,7 @@
           <a:p>
             <a:fld id="{D115692F-CE3A-4135-A072-A00A9E0CD8F4}" type="datetimeFigureOut">
               <a:rPr lang="es-ES" smtClean="0"/>
-              <a:t>01/04/2019</a:t>
+              <a:t>03/04/2019</a:t>
             </a:fld>
             <a:endParaRPr lang="es-ES"/>
           </a:p>
@@ -3566,7 +3572,7 @@
           <a:p>
             <a:fld id="{D115692F-CE3A-4135-A072-A00A9E0CD8F4}" type="datetimeFigureOut">
               <a:rPr lang="es-ES" smtClean="0"/>
-              <a:t>01/04/2019</a:t>
+              <a:t>03/04/2019</a:t>
             </a:fld>
             <a:endParaRPr lang="es-ES"/>
           </a:p>
@@ -3959,7 +3965,7 @@
           <a:p>
             <a:fld id="{D115692F-CE3A-4135-A072-A00A9E0CD8F4}" type="datetimeFigureOut">
               <a:rPr lang="es-ES" smtClean="0"/>
-              <a:t>01/04/2019</a:t>
+              <a:t>03/04/2019</a:t>
             </a:fld>
             <a:endParaRPr lang="es-ES"/>
           </a:p>
@@ -4129,7 +4135,7 @@
           <a:p>
             <a:fld id="{D115692F-CE3A-4135-A072-A00A9E0CD8F4}" type="datetimeFigureOut">
               <a:rPr lang="es-ES" smtClean="0"/>
-              <a:t>01/04/2019</a:t>
+              <a:t>03/04/2019</a:t>
             </a:fld>
             <a:endParaRPr lang="es-ES"/>
           </a:p>
@@ -4309,7 +4315,7 @@
           <a:p>
             <a:fld id="{D115692F-CE3A-4135-A072-A00A9E0CD8F4}" type="datetimeFigureOut">
               <a:rPr lang="es-ES" smtClean="0"/>
-              <a:t>01/04/2019</a:t>
+              <a:t>03/04/2019</a:t>
             </a:fld>
             <a:endParaRPr lang="es-ES"/>
           </a:p>
@@ -4485,7 +4491,7 @@
           <a:p>
             <a:fld id="{D115692F-CE3A-4135-A072-A00A9E0CD8F4}" type="datetimeFigureOut">
               <a:rPr lang="es-ES" smtClean="0"/>
-              <a:t>01/04/2019</a:t>
+              <a:t>03/04/2019</a:t>
             </a:fld>
             <a:endParaRPr lang="es-ES"/>
           </a:p>
@@ -4732,7 +4738,7 @@
           <a:p>
             <a:fld id="{D115692F-CE3A-4135-A072-A00A9E0CD8F4}" type="datetimeFigureOut">
               <a:rPr lang="es-ES" smtClean="0"/>
-              <a:t>01/04/2019</a:t>
+              <a:t>03/04/2019</a:t>
             </a:fld>
             <a:endParaRPr lang="es-ES"/>
           </a:p>
@@ -4964,7 +4970,7 @@
           <a:p>
             <a:fld id="{D115692F-CE3A-4135-A072-A00A9E0CD8F4}" type="datetimeFigureOut">
               <a:rPr lang="es-ES" smtClean="0"/>
-              <a:t>01/04/2019</a:t>
+              <a:t>03/04/2019</a:t>
             </a:fld>
             <a:endParaRPr lang="es-ES"/>
           </a:p>
@@ -5338,7 +5344,7 @@
           <a:p>
             <a:fld id="{D115692F-CE3A-4135-A072-A00A9E0CD8F4}" type="datetimeFigureOut">
               <a:rPr lang="es-ES" smtClean="0"/>
-              <a:t>01/04/2019</a:t>
+              <a:t>03/04/2019</a:t>
             </a:fld>
             <a:endParaRPr lang="es-ES"/>
           </a:p>
@@ -5461,7 +5467,7 @@
           <a:p>
             <a:fld id="{D115692F-CE3A-4135-A072-A00A9E0CD8F4}" type="datetimeFigureOut">
               <a:rPr lang="es-ES" smtClean="0"/>
-              <a:t>01/04/2019</a:t>
+              <a:t>03/04/2019</a:t>
             </a:fld>
             <a:endParaRPr lang="es-ES"/>
           </a:p>
@@ -5556,7 +5562,7 @@
           <a:p>
             <a:fld id="{D115692F-CE3A-4135-A072-A00A9E0CD8F4}" type="datetimeFigureOut">
               <a:rPr lang="es-ES" smtClean="0"/>
-              <a:t>01/04/2019</a:t>
+              <a:t>03/04/2019</a:t>
             </a:fld>
             <a:endParaRPr lang="es-ES"/>
           </a:p>
@@ -5811,7 +5817,7 @@
           <a:p>
             <a:fld id="{D115692F-CE3A-4135-A072-A00A9E0CD8F4}" type="datetimeFigureOut">
               <a:rPr lang="es-ES" smtClean="0"/>
-              <a:t>01/04/2019</a:t>
+              <a:t>03/04/2019</a:t>
             </a:fld>
             <a:endParaRPr lang="es-ES"/>
           </a:p>
@@ -6074,7 +6080,7 @@
           <a:p>
             <a:fld id="{D115692F-CE3A-4135-A072-A00A9E0CD8F4}" type="datetimeFigureOut">
               <a:rPr lang="es-ES" smtClean="0"/>
-              <a:t>01/04/2019</a:t>
+              <a:t>03/04/2019</a:t>
             </a:fld>
             <a:endParaRPr lang="es-ES"/>
           </a:p>
@@ -6817,7 +6823,7 @@
           <a:p>
             <a:fld id="{D115692F-CE3A-4135-A072-A00A9E0CD8F4}" type="datetimeFigureOut">
               <a:rPr lang="es-ES" smtClean="0"/>
-              <a:t>01/04/2019</a:t>
+              <a:t>03/04/2019</a:t>
             </a:fld>
             <a:endParaRPr lang="es-ES"/>
           </a:p>
@@ -7451,6 +7457,970 @@
           <a:chExt cx="0" cy="0"/>
         </a:xfrm>
       </p:grpSpPr>
+      <p:sp>
+        <p:nvSpPr>
+          <p:cNvPr id="2" name="Título 1">
+            <a:extLst>
+              <a:ext uri="{FF2B5EF4-FFF2-40B4-BE49-F238E27FC236}">
+                <a16:creationId xmlns:a16="http://schemas.microsoft.com/office/drawing/2014/main" id="{1FA2B05A-7C0C-4C15-8CEC-CA557E1C4307}"/>
+              </a:ext>
+            </a:extLst>
+          </p:cNvPr>
+          <p:cNvSpPr>
+            <a:spLocks noGrp="1"/>
+          </p:cNvSpPr>
+          <p:nvPr>
+            <p:ph type="title"/>
+          </p:nvPr>
+        </p:nvSpPr>
+        <p:spPr>
+          <a:xfrm>
+            <a:off x="0" y="0"/>
+            <a:ext cx="9295002" cy="598415"/>
+          </a:xfrm>
+        </p:spPr>
+        <p:txBody>
+          <a:bodyPr>
+            <a:normAutofit fontScale="90000"/>
+          </a:bodyPr>
+          <a:lstStyle/>
+          <a:p>
+            <a:r>
+              <a:rPr lang="es-ES" dirty="0"/>
+              <a:t>Imprimir la tabla de multiplicar de un número</a:t>
+            </a:r>
+          </a:p>
+        </p:txBody>
+      </p:sp>
+      <p:sp>
+        <p:nvSpPr>
+          <p:cNvPr id="5" name="Diagrama de flujo: documento 4">
+            <a:extLst>
+              <a:ext uri="{FF2B5EF4-FFF2-40B4-BE49-F238E27FC236}">
+                <a16:creationId xmlns:a16="http://schemas.microsoft.com/office/drawing/2014/main" id="{68311E47-A87A-4224-84FE-F944E6D901FE}"/>
+              </a:ext>
+            </a:extLst>
+          </p:cNvPr>
+          <p:cNvSpPr/>
+          <p:nvPr/>
+        </p:nvSpPr>
+        <p:spPr>
+          <a:xfrm>
+            <a:off x="1256489" y="4724320"/>
+            <a:ext cx="2088858" cy="628552"/>
+          </a:xfrm>
+          <a:prstGeom prst="flowChartDocument">
+            <a:avLst/>
+          </a:prstGeom>
+        </p:spPr>
+        <p:style>
+          <a:lnRef idx="2">
+            <a:schemeClr val="dk1"/>
+          </a:lnRef>
+          <a:fillRef idx="1">
+            <a:schemeClr val="lt1"/>
+          </a:fillRef>
+          <a:effectRef idx="0">
+            <a:schemeClr val="dk1"/>
+          </a:effectRef>
+          <a:fontRef idx="minor">
+            <a:schemeClr val="dk1"/>
+          </a:fontRef>
+        </p:style>
+        <p:txBody>
+          <a:bodyPr rtlCol="0" anchor="ctr"/>
+          <a:lstStyle/>
+          <a:p>
+            <a:pPr algn="ctr"/>
+            <a:r>
+              <a:rPr lang="es-ES" dirty="0" err="1"/>
+              <a:t>Print</a:t>
+            </a:r>
+            <a:r>
+              <a:rPr lang="es-ES" dirty="0"/>
+              <a:t> numero * i</a:t>
+            </a:r>
+          </a:p>
+        </p:txBody>
+      </p:sp>
+      <p:cxnSp>
+        <p:nvCxnSpPr>
+          <p:cNvPr id="6" name="Conector recto de flecha 5">
+            <a:extLst>
+              <a:ext uri="{FF2B5EF4-FFF2-40B4-BE49-F238E27FC236}">
+                <a16:creationId xmlns:a16="http://schemas.microsoft.com/office/drawing/2014/main" id="{CF6442B0-FAA3-4EEB-8C4A-8BC2071A5CD8}"/>
+              </a:ext>
+            </a:extLst>
+          </p:cNvPr>
+          <p:cNvCxnSpPr>
+            <a:cxnSpLocks/>
+            <a:stCxn id="23" idx="2"/>
+          </p:cNvCxnSpPr>
+          <p:nvPr/>
+        </p:nvCxnSpPr>
+        <p:spPr>
+          <a:xfrm flipH="1">
+            <a:off x="2300919" y="2603714"/>
+            <a:ext cx="23396" cy="638591"/>
+          </a:xfrm>
+          <a:prstGeom prst="straightConnector1">
+            <a:avLst/>
+          </a:prstGeom>
+          <a:ln>
+            <a:tailEnd type="triangle"/>
+          </a:ln>
+        </p:spPr>
+        <p:style>
+          <a:lnRef idx="1">
+            <a:schemeClr val="accent1"/>
+          </a:lnRef>
+          <a:fillRef idx="0">
+            <a:schemeClr val="accent1"/>
+          </a:fillRef>
+          <a:effectRef idx="0">
+            <a:schemeClr val="accent1"/>
+          </a:effectRef>
+          <a:fontRef idx="minor">
+            <a:schemeClr val="tx1"/>
+          </a:fontRef>
+        </p:style>
+      </p:cxnSp>
+      <p:cxnSp>
+        <p:nvCxnSpPr>
+          <p:cNvPr id="7" name="Conector recto de flecha 6">
+            <a:extLst>
+              <a:ext uri="{FF2B5EF4-FFF2-40B4-BE49-F238E27FC236}">
+                <a16:creationId xmlns:a16="http://schemas.microsoft.com/office/drawing/2014/main" id="{67D000BC-E4E2-404D-A901-B1D7DE277867}"/>
+              </a:ext>
+            </a:extLst>
+          </p:cNvPr>
+          <p:cNvCxnSpPr>
+            <a:cxnSpLocks/>
+          </p:cNvCxnSpPr>
+          <p:nvPr/>
+        </p:nvCxnSpPr>
+        <p:spPr>
+          <a:xfrm flipH="1">
+            <a:off x="2300915" y="4210494"/>
+            <a:ext cx="1" cy="513826"/>
+          </a:xfrm>
+          <a:prstGeom prst="straightConnector1">
+            <a:avLst/>
+          </a:prstGeom>
+          <a:ln>
+            <a:tailEnd type="triangle"/>
+          </a:ln>
+        </p:spPr>
+        <p:style>
+          <a:lnRef idx="1">
+            <a:schemeClr val="accent1"/>
+          </a:lnRef>
+          <a:fillRef idx="0">
+            <a:schemeClr val="accent1"/>
+          </a:fillRef>
+          <a:effectRef idx="0">
+            <a:schemeClr val="accent1"/>
+          </a:effectRef>
+          <a:fontRef idx="minor">
+            <a:schemeClr val="tx1"/>
+          </a:fontRef>
+        </p:style>
+      </p:cxnSp>
+      <p:cxnSp>
+        <p:nvCxnSpPr>
+          <p:cNvPr id="8" name="Conector recto de flecha 7">
+            <a:extLst>
+              <a:ext uri="{FF2B5EF4-FFF2-40B4-BE49-F238E27FC236}">
+                <a16:creationId xmlns:a16="http://schemas.microsoft.com/office/drawing/2014/main" id="{DF1584A5-F8C4-42A1-9572-63228D2A1F9C}"/>
+              </a:ext>
+            </a:extLst>
+          </p:cNvPr>
+          <p:cNvCxnSpPr>
+            <a:cxnSpLocks/>
+          </p:cNvCxnSpPr>
+          <p:nvPr/>
+        </p:nvCxnSpPr>
+        <p:spPr>
+          <a:xfrm>
+            <a:off x="2300914" y="1828328"/>
+            <a:ext cx="5" cy="207477"/>
+          </a:xfrm>
+          <a:prstGeom prst="straightConnector1">
+            <a:avLst/>
+          </a:prstGeom>
+          <a:ln>
+            <a:tailEnd type="triangle"/>
+          </a:ln>
+        </p:spPr>
+        <p:style>
+          <a:lnRef idx="1">
+            <a:schemeClr val="accent1"/>
+          </a:lnRef>
+          <a:fillRef idx="0">
+            <a:schemeClr val="accent1"/>
+          </a:fillRef>
+          <a:effectRef idx="0">
+            <a:schemeClr val="accent1"/>
+          </a:effectRef>
+          <a:fontRef idx="minor">
+            <a:schemeClr val="tx1"/>
+          </a:fontRef>
+        </p:style>
+      </p:cxnSp>
+      <p:sp>
+        <p:nvSpPr>
+          <p:cNvPr id="10" name="Diagrama de flujo: decisión 9">
+            <a:extLst>
+              <a:ext uri="{FF2B5EF4-FFF2-40B4-BE49-F238E27FC236}">
+                <a16:creationId xmlns:a16="http://schemas.microsoft.com/office/drawing/2014/main" id="{B442817B-AC6A-4EC4-845B-D117D70E7684}"/>
+              </a:ext>
+            </a:extLst>
+          </p:cNvPr>
+          <p:cNvSpPr/>
+          <p:nvPr/>
+        </p:nvSpPr>
+        <p:spPr>
+          <a:xfrm>
+            <a:off x="1256489" y="2839944"/>
+            <a:ext cx="2088855" cy="1335575"/>
+          </a:xfrm>
+          <a:prstGeom prst="flowChartDecision">
+            <a:avLst/>
+          </a:prstGeom>
+        </p:spPr>
+        <p:style>
+          <a:lnRef idx="2">
+            <a:schemeClr val="dk1"/>
+          </a:lnRef>
+          <a:fillRef idx="1">
+            <a:schemeClr val="lt1"/>
+          </a:fillRef>
+          <a:effectRef idx="0">
+            <a:schemeClr val="dk1"/>
+          </a:effectRef>
+          <a:fontRef idx="minor">
+            <a:schemeClr val="dk1"/>
+          </a:fontRef>
+        </p:style>
+        <p:txBody>
+          <a:bodyPr rtlCol="0" anchor="ctr"/>
+          <a:lstStyle/>
+          <a:p>
+            <a:pPr algn="ctr"/>
+            <a:r>
+              <a:rPr lang="es-ES" dirty="0"/>
+              <a:t>I &lt;= 10</a:t>
+            </a:r>
+          </a:p>
+        </p:txBody>
+      </p:sp>
+      <p:sp>
+        <p:nvSpPr>
+          <p:cNvPr id="14" name="CuadroTexto 13">
+            <a:extLst>
+              <a:ext uri="{FF2B5EF4-FFF2-40B4-BE49-F238E27FC236}">
+                <a16:creationId xmlns:a16="http://schemas.microsoft.com/office/drawing/2014/main" id="{9145DB9C-57FD-4B52-9C1E-A449AD0651E7}"/>
+              </a:ext>
+            </a:extLst>
+          </p:cNvPr>
+          <p:cNvSpPr txBox="1"/>
+          <p:nvPr/>
+        </p:nvSpPr>
+        <p:spPr>
+          <a:xfrm>
+            <a:off x="2308084" y="4282741"/>
+            <a:ext cx="343364" cy="369332"/>
+          </a:xfrm>
+          <a:prstGeom prst="rect">
+            <a:avLst/>
+          </a:prstGeom>
+          <a:noFill/>
+        </p:spPr>
+        <p:txBody>
+          <a:bodyPr wrap="none" rtlCol="0">
+            <a:spAutoFit/>
+          </a:bodyPr>
+          <a:lstStyle/>
+          <a:p>
+            <a:r>
+              <a:rPr lang="es-ES" dirty="0"/>
+              <a:t>si</a:t>
+            </a:r>
+          </a:p>
+        </p:txBody>
+      </p:sp>
+      <p:cxnSp>
+        <p:nvCxnSpPr>
+          <p:cNvPr id="16" name="Conector recto de flecha 15">
+            <a:extLst>
+              <a:ext uri="{FF2B5EF4-FFF2-40B4-BE49-F238E27FC236}">
+                <a16:creationId xmlns:a16="http://schemas.microsoft.com/office/drawing/2014/main" id="{9E3F010C-6F82-4F93-B6F5-CB3CEA99535D}"/>
+              </a:ext>
+            </a:extLst>
+          </p:cNvPr>
+          <p:cNvCxnSpPr>
+            <a:cxnSpLocks/>
+            <a:stCxn id="5" idx="2"/>
+          </p:cNvCxnSpPr>
+          <p:nvPr/>
+        </p:nvCxnSpPr>
+        <p:spPr>
+          <a:xfrm flipH="1">
+            <a:off x="2300915" y="5311318"/>
+            <a:ext cx="3" cy="276079"/>
+          </a:xfrm>
+          <a:prstGeom prst="straightConnector1">
+            <a:avLst/>
+          </a:prstGeom>
+          <a:ln>
+            <a:tailEnd type="triangle"/>
+          </a:ln>
+        </p:spPr>
+        <p:style>
+          <a:lnRef idx="1">
+            <a:schemeClr val="accent1"/>
+          </a:lnRef>
+          <a:fillRef idx="0">
+            <a:schemeClr val="accent1"/>
+          </a:fillRef>
+          <a:effectRef idx="0">
+            <a:schemeClr val="accent1"/>
+          </a:effectRef>
+          <a:fontRef idx="minor">
+            <a:schemeClr val="tx1"/>
+          </a:fontRef>
+        </p:style>
+      </p:cxnSp>
+      <p:cxnSp>
+        <p:nvCxnSpPr>
+          <p:cNvPr id="18" name="Conector recto de flecha 17">
+            <a:extLst>
+              <a:ext uri="{FF2B5EF4-FFF2-40B4-BE49-F238E27FC236}">
+                <a16:creationId xmlns:a16="http://schemas.microsoft.com/office/drawing/2014/main" id="{7EDB7357-713F-4FF7-A8DE-CCDF9EA081DD}"/>
+              </a:ext>
+            </a:extLst>
+          </p:cNvPr>
+          <p:cNvCxnSpPr>
+            <a:cxnSpLocks/>
+          </p:cNvCxnSpPr>
+          <p:nvPr/>
+        </p:nvCxnSpPr>
+        <p:spPr>
+          <a:xfrm flipH="1">
+            <a:off x="2300914" y="6215949"/>
+            <a:ext cx="1" cy="243574"/>
+          </a:xfrm>
+          <a:prstGeom prst="straightConnector1">
+            <a:avLst/>
+          </a:prstGeom>
+          <a:ln>
+            <a:tailEnd type="triangle"/>
+          </a:ln>
+        </p:spPr>
+        <p:style>
+          <a:lnRef idx="1">
+            <a:schemeClr val="accent1"/>
+          </a:lnRef>
+          <a:fillRef idx="0">
+            <a:schemeClr val="accent1"/>
+          </a:fillRef>
+          <a:effectRef idx="0">
+            <a:schemeClr val="accent1"/>
+          </a:effectRef>
+          <a:fontRef idx="minor">
+            <a:schemeClr val="tx1"/>
+          </a:fontRef>
+        </p:style>
+      </p:cxnSp>
+      <p:sp>
+        <p:nvSpPr>
+          <p:cNvPr id="19" name="Diagrama de flujo: terminador 18">
+            <a:extLst>
+              <a:ext uri="{FF2B5EF4-FFF2-40B4-BE49-F238E27FC236}">
+                <a16:creationId xmlns:a16="http://schemas.microsoft.com/office/drawing/2014/main" id="{069B01D8-E416-42FE-9FC7-25DF9BBE97DD}"/>
+              </a:ext>
+            </a:extLst>
+          </p:cNvPr>
+          <p:cNvSpPr/>
+          <p:nvPr/>
+        </p:nvSpPr>
+        <p:spPr>
+          <a:xfrm>
+            <a:off x="1303296" y="645231"/>
+            <a:ext cx="2088859" cy="327032"/>
+          </a:xfrm>
+          <a:prstGeom prst="flowChartTerminator">
+            <a:avLst/>
+          </a:prstGeom>
+        </p:spPr>
+        <p:style>
+          <a:lnRef idx="2">
+            <a:schemeClr val="dk1"/>
+          </a:lnRef>
+          <a:fillRef idx="1">
+            <a:schemeClr val="lt1"/>
+          </a:fillRef>
+          <a:effectRef idx="0">
+            <a:schemeClr val="dk1"/>
+          </a:effectRef>
+          <a:fontRef idx="minor">
+            <a:schemeClr val="dk1"/>
+          </a:fontRef>
+        </p:style>
+        <p:txBody>
+          <a:bodyPr rtlCol="0" anchor="ctr"/>
+          <a:lstStyle/>
+          <a:p>
+            <a:pPr algn="ctr"/>
+            <a:r>
+              <a:rPr lang="es-ES" dirty="0"/>
+              <a:t>inicio</a:t>
+            </a:r>
+          </a:p>
+        </p:txBody>
+      </p:sp>
+      <p:cxnSp>
+        <p:nvCxnSpPr>
+          <p:cNvPr id="20" name="Conector recto de flecha 19">
+            <a:extLst>
+              <a:ext uri="{FF2B5EF4-FFF2-40B4-BE49-F238E27FC236}">
+                <a16:creationId xmlns:a16="http://schemas.microsoft.com/office/drawing/2014/main" id="{EB39F551-8492-453C-BC41-B0A49C1D10C0}"/>
+              </a:ext>
+            </a:extLst>
+          </p:cNvPr>
+          <p:cNvCxnSpPr>
+            <a:cxnSpLocks/>
+          </p:cNvCxnSpPr>
+          <p:nvPr/>
+        </p:nvCxnSpPr>
+        <p:spPr>
+          <a:xfrm>
+            <a:off x="3345344" y="5901673"/>
+            <a:ext cx="0" cy="0"/>
+          </a:xfrm>
+          <a:prstGeom prst="straightConnector1">
+            <a:avLst/>
+          </a:prstGeom>
+          <a:ln>
+            <a:tailEnd type="triangle"/>
+          </a:ln>
+        </p:spPr>
+        <p:style>
+          <a:lnRef idx="1">
+            <a:schemeClr val="accent1"/>
+          </a:lnRef>
+          <a:fillRef idx="0">
+            <a:schemeClr val="accent1"/>
+          </a:fillRef>
+          <a:effectRef idx="0">
+            <a:schemeClr val="accent1"/>
+          </a:effectRef>
+          <a:fontRef idx="minor">
+            <a:schemeClr val="tx1"/>
+          </a:fontRef>
+        </p:style>
+      </p:cxnSp>
+      <p:sp>
+        <p:nvSpPr>
+          <p:cNvPr id="22" name="Rectángulo: esquinas superiores, una redondeada y la otra cortada 21">
+            <a:extLst>
+              <a:ext uri="{FF2B5EF4-FFF2-40B4-BE49-F238E27FC236}">
+                <a16:creationId xmlns:a16="http://schemas.microsoft.com/office/drawing/2014/main" id="{C014D824-388D-45E5-A607-AAF4D5C97812}"/>
+              </a:ext>
+            </a:extLst>
+          </p:cNvPr>
+          <p:cNvSpPr/>
+          <p:nvPr/>
+        </p:nvSpPr>
+        <p:spPr>
+          <a:xfrm>
+            <a:off x="1303296" y="1119379"/>
+            <a:ext cx="2088859" cy="628552"/>
+          </a:xfrm>
+          <a:prstGeom prst="snipRoundRect">
+            <a:avLst/>
+          </a:prstGeom>
+        </p:spPr>
+        <p:style>
+          <a:lnRef idx="2">
+            <a:schemeClr val="dk1"/>
+          </a:lnRef>
+          <a:fillRef idx="1">
+            <a:schemeClr val="lt1"/>
+          </a:fillRef>
+          <a:effectRef idx="0">
+            <a:schemeClr val="dk1"/>
+          </a:effectRef>
+          <a:fontRef idx="minor">
+            <a:schemeClr val="dk1"/>
+          </a:fontRef>
+        </p:style>
+        <p:txBody>
+          <a:bodyPr rtlCol="0" anchor="ctr"/>
+          <a:lstStyle/>
+          <a:p>
+            <a:pPr algn="ctr"/>
+            <a:r>
+              <a:rPr lang="es-ES" dirty="0"/>
+              <a:t>numero = leer numero</a:t>
+            </a:r>
+          </a:p>
+        </p:txBody>
+      </p:sp>
+      <p:sp>
+        <p:nvSpPr>
+          <p:cNvPr id="23" name="Rectángulo 22">
+            <a:extLst>
+              <a:ext uri="{FF2B5EF4-FFF2-40B4-BE49-F238E27FC236}">
+                <a16:creationId xmlns:a16="http://schemas.microsoft.com/office/drawing/2014/main" id="{60714763-3657-46D5-BFB1-6C35FDBFEECB}"/>
+              </a:ext>
+            </a:extLst>
+          </p:cNvPr>
+          <p:cNvSpPr/>
+          <p:nvPr/>
+        </p:nvSpPr>
+        <p:spPr>
+          <a:xfrm>
+            <a:off x="1303297" y="2004774"/>
+            <a:ext cx="2042036" cy="598940"/>
+          </a:xfrm>
+          <a:prstGeom prst="rect">
+            <a:avLst/>
+          </a:prstGeom>
+        </p:spPr>
+        <p:style>
+          <a:lnRef idx="2">
+            <a:schemeClr val="dk1"/>
+          </a:lnRef>
+          <a:fillRef idx="1">
+            <a:schemeClr val="lt1"/>
+          </a:fillRef>
+          <a:effectRef idx="0">
+            <a:schemeClr val="dk1"/>
+          </a:effectRef>
+          <a:fontRef idx="minor">
+            <a:schemeClr val="dk1"/>
+          </a:fontRef>
+        </p:style>
+        <p:txBody>
+          <a:bodyPr rtlCol="0" anchor="ctr"/>
+          <a:lstStyle/>
+          <a:p>
+            <a:pPr algn="ctr"/>
+            <a:r>
+              <a:rPr lang="es-ES" dirty="0"/>
+              <a:t>I = 1</a:t>
+            </a:r>
+          </a:p>
+        </p:txBody>
+      </p:sp>
+      <p:sp>
+        <p:nvSpPr>
+          <p:cNvPr id="25" name="Rectángulo 24">
+            <a:extLst>
+              <a:ext uri="{FF2B5EF4-FFF2-40B4-BE49-F238E27FC236}">
+                <a16:creationId xmlns:a16="http://schemas.microsoft.com/office/drawing/2014/main" id="{AA7EE4DF-073A-474D-A4EE-1745F56A7F10}"/>
+              </a:ext>
+            </a:extLst>
+          </p:cNvPr>
+          <p:cNvSpPr/>
+          <p:nvPr/>
+        </p:nvSpPr>
+        <p:spPr>
+          <a:xfrm>
+            <a:off x="1256489" y="5591397"/>
+            <a:ext cx="2042036" cy="598940"/>
+          </a:xfrm>
+          <a:prstGeom prst="rect">
+            <a:avLst/>
+          </a:prstGeom>
+        </p:spPr>
+        <p:style>
+          <a:lnRef idx="2">
+            <a:schemeClr val="dk1"/>
+          </a:lnRef>
+          <a:fillRef idx="1">
+            <a:schemeClr val="lt1"/>
+          </a:fillRef>
+          <a:effectRef idx="0">
+            <a:schemeClr val="dk1"/>
+          </a:effectRef>
+          <a:fontRef idx="minor">
+            <a:schemeClr val="dk1"/>
+          </a:fontRef>
+        </p:style>
+        <p:txBody>
+          <a:bodyPr rtlCol="0" anchor="ctr"/>
+          <a:lstStyle/>
+          <a:p>
+            <a:pPr algn="ctr"/>
+            <a:r>
+              <a:rPr lang="es-ES" dirty="0"/>
+              <a:t>I = I + 1</a:t>
+            </a:r>
+          </a:p>
+        </p:txBody>
+      </p:sp>
+      <p:pic>
+        <p:nvPicPr>
+          <p:cNvPr id="26" name="Imagen 25">
+            <a:extLst>
+              <a:ext uri="{FF2B5EF4-FFF2-40B4-BE49-F238E27FC236}">
+                <a16:creationId xmlns:a16="http://schemas.microsoft.com/office/drawing/2014/main" id="{183C101D-971B-45A3-8252-0B8657CA44A0}"/>
+              </a:ext>
+            </a:extLst>
+          </p:cNvPr>
+          <p:cNvPicPr>
+            <a:picLocks noChangeAspect="1"/>
+          </p:cNvPicPr>
+          <p:nvPr/>
+        </p:nvPicPr>
+        <p:blipFill>
+          <a:blip r:embed="rId2"/>
+          <a:stretch>
+            <a:fillRect/>
+          </a:stretch>
+        </p:blipFill>
+        <p:spPr>
+          <a:xfrm>
+            <a:off x="3925333" y="730167"/>
+            <a:ext cx="7943373" cy="1098162"/>
+          </a:xfrm>
+          <a:prstGeom prst="rect">
+            <a:avLst/>
+          </a:prstGeom>
+        </p:spPr>
+      </p:pic>
+      <p:pic>
+        <p:nvPicPr>
+          <p:cNvPr id="27" name="Imagen 26">
+            <a:extLst>
+              <a:ext uri="{FF2B5EF4-FFF2-40B4-BE49-F238E27FC236}">
+                <a16:creationId xmlns:a16="http://schemas.microsoft.com/office/drawing/2014/main" id="{35EF4E91-FBF0-4E2D-8094-426E84D1F49E}"/>
+              </a:ext>
+            </a:extLst>
+          </p:cNvPr>
+          <p:cNvPicPr>
+            <a:picLocks noChangeAspect="1"/>
+          </p:cNvPicPr>
+          <p:nvPr/>
+        </p:nvPicPr>
+        <p:blipFill>
+          <a:blip r:embed="rId3"/>
+          <a:stretch>
+            <a:fillRect/>
+          </a:stretch>
+        </p:blipFill>
+        <p:spPr>
+          <a:xfrm>
+            <a:off x="3925334" y="2035805"/>
+            <a:ext cx="7962518" cy="4714933"/>
+          </a:xfrm>
+          <a:prstGeom prst="rect">
+            <a:avLst/>
+          </a:prstGeom>
+        </p:spPr>
+      </p:pic>
+      <p:cxnSp>
+        <p:nvCxnSpPr>
+          <p:cNvPr id="29" name="Conector: angular 28">
+            <a:extLst>
+              <a:ext uri="{FF2B5EF4-FFF2-40B4-BE49-F238E27FC236}">
+                <a16:creationId xmlns:a16="http://schemas.microsoft.com/office/drawing/2014/main" id="{A635003E-886A-4152-ACFA-EFF118CFFFAC}"/>
+              </a:ext>
+            </a:extLst>
+          </p:cNvPr>
+          <p:cNvCxnSpPr>
+            <a:stCxn id="25" idx="1"/>
+            <a:endCxn id="10" idx="1"/>
+          </p:cNvCxnSpPr>
+          <p:nvPr/>
+        </p:nvCxnSpPr>
+        <p:spPr>
+          <a:xfrm rot="10800000">
+            <a:off x="1256489" y="3507733"/>
+            <a:ext cx="12700" cy="2383135"/>
+          </a:xfrm>
+          <a:prstGeom prst="bentConnector3">
+            <a:avLst>
+              <a:gd name="adj1" fmla="val 1800000"/>
+            </a:avLst>
+          </a:prstGeom>
+          <a:ln>
+            <a:tailEnd type="triangle"/>
+          </a:ln>
+        </p:spPr>
+        <p:style>
+          <a:lnRef idx="1">
+            <a:schemeClr val="accent1"/>
+          </a:lnRef>
+          <a:fillRef idx="0">
+            <a:schemeClr val="accent1"/>
+          </a:fillRef>
+          <a:effectRef idx="0">
+            <a:schemeClr val="accent1"/>
+          </a:effectRef>
+          <a:fontRef idx="minor">
+            <a:schemeClr val="tx1"/>
+          </a:fontRef>
+        </p:style>
+      </p:cxnSp>
+      <p:cxnSp>
+        <p:nvCxnSpPr>
+          <p:cNvPr id="31" name="Conector: angular 30">
+            <a:extLst>
+              <a:ext uri="{FF2B5EF4-FFF2-40B4-BE49-F238E27FC236}">
+                <a16:creationId xmlns:a16="http://schemas.microsoft.com/office/drawing/2014/main" id="{7E4205F9-3897-446F-AE42-DB2A6C22B41B}"/>
+              </a:ext>
+            </a:extLst>
+          </p:cNvPr>
+          <p:cNvCxnSpPr>
+            <a:stCxn id="10" idx="3"/>
+          </p:cNvCxnSpPr>
+          <p:nvPr/>
+        </p:nvCxnSpPr>
+        <p:spPr>
+          <a:xfrm>
+            <a:off x="3345344" y="3507732"/>
+            <a:ext cx="178032" cy="2951791"/>
+          </a:xfrm>
+          <a:prstGeom prst="bentConnector2">
+            <a:avLst/>
+          </a:prstGeom>
+          <a:ln>
+            <a:tailEnd type="triangle"/>
+          </a:ln>
+        </p:spPr>
+        <p:style>
+          <a:lnRef idx="1">
+            <a:schemeClr val="accent1"/>
+          </a:lnRef>
+          <a:fillRef idx="0">
+            <a:schemeClr val="accent1"/>
+          </a:fillRef>
+          <a:effectRef idx="0">
+            <a:schemeClr val="accent1"/>
+          </a:effectRef>
+          <a:fontRef idx="minor">
+            <a:schemeClr val="tx1"/>
+          </a:fontRef>
+        </p:style>
+      </p:cxnSp>
+      <p:cxnSp>
+        <p:nvCxnSpPr>
+          <p:cNvPr id="33" name="Conector recto de flecha 32">
+            <a:extLst>
+              <a:ext uri="{FF2B5EF4-FFF2-40B4-BE49-F238E27FC236}">
+                <a16:creationId xmlns:a16="http://schemas.microsoft.com/office/drawing/2014/main" id="{DC08B29F-4A12-41AF-A135-6BFF128CCC27}"/>
+              </a:ext>
+            </a:extLst>
+          </p:cNvPr>
+          <p:cNvCxnSpPr/>
+          <p:nvPr/>
+        </p:nvCxnSpPr>
+        <p:spPr>
+          <a:xfrm flipH="1">
+            <a:off x="2293746" y="6459523"/>
+            <a:ext cx="1229167" cy="0"/>
+          </a:xfrm>
+          <a:prstGeom prst="straightConnector1">
+            <a:avLst/>
+          </a:prstGeom>
+          <a:ln>
+            <a:tailEnd type="triangle"/>
+          </a:ln>
+        </p:spPr>
+        <p:style>
+          <a:lnRef idx="1">
+            <a:schemeClr val="accent1"/>
+          </a:lnRef>
+          <a:fillRef idx="0">
+            <a:schemeClr val="accent1"/>
+          </a:fillRef>
+          <a:effectRef idx="0">
+            <a:schemeClr val="accent1"/>
+          </a:effectRef>
+          <a:fontRef idx="minor">
+            <a:schemeClr val="tx1"/>
+          </a:fontRef>
+        </p:style>
+      </p:cxnSp>
+      <p:sp>
+        <p:nvSpPr>
+          <p:cNvPr id="34" name="CuadroTexto 33">
+            <a:extLst>
+              <a:ext uri="{FF2B5EF4-FFF2-40B4-BE49-F238E27FC236}">
+                <a16:creationId xmlns:a16="http://schemas.microsoft.com/office/drawing/2014/main" id="{FE419A59-3C25-4708-9F41-DB95BF592C37}"/>
+              </a:ext>
+            </a:extLst>
+          </p:cNvPr>
+          <p:cNvSpPr txBox="1"/>
+          <p:nvPr/>
+        </p:nvSpPr>
+        <p:spPr>
+          <a:xfrm>
+            <a:off x="3345333" y="3043451"/>
+            <a:ext cx="487634" cy="369332"/>
+          </a:xfrm>
+          <a:prstGeom prst="rect">
+            <a:avLst/>
+          </a:prstGeom>
+        </p:spPr>
+        <p:style>
+          <a:lnRef idx="2">
+            <a:schemeClr val="dk1"/>
+          </a:lnRef>
+          <a:fillRef idx="1">
+            <a:schemeClr val="lt1"/>
+          </a:fillRef>
+          <a:effectRef idx="0">
+            <a:schemeClr val="dk1"/>
+          </a:effectRef>
+          <a:fontRef idx="minor">
+            <a:schemeClr val="dk1"/>
+          </a:fontRef>
+        </p:style>
+        <p:txBody>
+          <a:bodyPr wrap="none" rtlCol="0">
+            <a:spAutoFit/>
+          </a:bodyPr>
+          <a:lstStyle/>
+          <a:p>
+            <a:r>
+              <a:rPr lang="es-ES" dirty="0"/>
+              <a:t>NO</a:t>
+            </a:r>
+          </a:p>
+        </p:txBody>
+      </p:sp>
+      <p:sp>
+        <p:nvSpPr>
+          <p:cNvPr id="36" name="CuadroTexto 35">
+            <a:extLst>
+              <a:ext uri="{FF2B5EF4-FFF2-40B4-BE49-F238E27FC236}">
+                <a16:creationId xmlns:a16="http://schemas.microsoft.com/office/drawing/2014/main" id="{43ABA4DD-BE34-4D75-94FA-803387CCAF94}"/>
+              </a:ext>
+            </a:extLst>
+          </p:cNvPr>
+          <p:cNvSpPr txBox="1"/>
+          <p:nvPr/>
+        </p:nvSpPr>
+        <p:spPr>
+          <a:xfrm>
+            <a:off x="2393271" y="4270468"/>
+            <a:ext cx="359394" cy="369332"/>
+          </a:xfrm>
+          <a:prstGeom prst="rect">
+            <a:avLst/>
+          </a:prstGeom>
+        </p:spPr>
+        <p:style>
+          <a:lnRef idx="2">
+            <a:schemeClr val="dk1"/>
+          </a:lnRef>
+          <a:fillRef idx="1">
+            <a:schemeClr val="lt1"/>
+          </a:fillRef>
+          <a:effectRef idx="0">
+            <a:schemeClr val="dk1"/>
+          </a:effectRef>
+          <a:fontRef idx="minor">
+            <a:schemeClr val="dk1"/>
+          </a:fontRef>
+        </p:style>
+        <p:txBody>
+          <a:bodyPr wrap="none" rtlCol="0">
+            <a:spAutoFit/>
+          </a:bodyPr>
+          <a:lstStyle/>
+          <a:p>
+            <a:r>
+              <a:rPr lang="es-ES" dirty="0"/>
+              <a:t>SI</a:t>
+            </a:r>
+          </a:p>
+        </p:txBody>
+      </p:sp>
+      <p:sp>
+        <p:nvSpPr>
+          <p:cNvPr id="24" name="CuadroTexto 23">
+            <a:extLst>
+              <a:ext uri="{FF2B5EF4-FFF2-40B4-BE49-F238E27FC236}">
+                <a16:creationId xmlns:a16="http://schemas.microsoft.com/office/drawing/2014/main" id="{75FEFEDC-ADE2-481B-B127-FF7C1A845017}"/>
+              </a:ext>
+            </a:extLst>
+          </p:cNvPr>
+          <p:cNvSpPr txBox="1"/>
+          <p:nvPr/>
+        </p:nvSpPr>
+        <p:spPr>
+          <a:xfrm>
+            <a:off x="8716162" y="107262"/>
+            <a:ext cx="1656223" cy="369332"/>
+          </a:xfrm>
+          <a:prstGeom prst="rect">
+            <a:avLst/>
+          </a:prstGeom>
+        </p:spPr>
+        <p:style>
+          <a:lnRef idx="2">
+            <a:schemeClr val="accent1">
+              <a:shade val="50000"/>
+            </a:schemeClr>
+          </a:lnRef>
+          <a:fillRef idx="1">
+            <a:schemeClr val="accent1"/>
+          </a:fillRef>
+          <a:effectRef idx="0">
+            <a:schemeClr val="accent1"/>
+          </a:effectRef>
+          <a:fontRef idx="minor">
+            <a:schemeClr val="lt1"/>
+          </a:fontRef>
+        </p:style>
+        <p:txBody>
+          <a:bodyPr wrap="square" rtlCol="0">
+            <a:spAutoFit/>
+          </a:bodyPr>
+          <a:lstStyle/>
+          <a:p>
+            <a:r>
+              <a:rPr lang="es-ES" dirty="0"/>
+              <a:t>05-tabla.py</a:t>
+            </a:r>
+          </a:p>
+        </p:txBody>
+      </p:sp>
+    </p:spTree>
+    <p:extLst>
+      <p:ext uri="{BB962C8B-B14F-4D97-AF65-F5344CB8AC3E}">
+        <p14:creationId xmlns:p14="http://schemas.microsoft.com/office/powerpoint/2010/main" val="650898825"/>
+      </p:ext>
+    </p:extLst>
+  </p:cSld>
+  <p:clrMapOvr>
+    <a:masterClrMapping/>
+  </p:clrMapOvr>
+</p:sld>
+</file>
+
+<file path=ppt/slides/slide11.xml><?xml version="1.0" encoding="utf-8"?>
+<p:sld xmlns:a="http://schemas.openxmlformats.org/drawingml/2006/main" xmlns:r="http://schemas.openxmlformats.org/officeDocument/2006/relationships" xmlns:p="http://schemas.openxmlformats.org/presentationml/2006/main">
+  <p:cSld>
+    <p:spTree>
+      <p:nvGrpSpPr>
+        <p:cNvPr id="1" name=""/>
+        <p:cNvGrpSpPr/>
+        <p:nvPr/>
+      </p:nvGrpSpPr>
+      <p:grpSpPr>
+        <a:xfrm>
+          <a:off x="0" y="0"/>
+          <a:ext cx="0" cy="0"/>
+          <a:chOff x="0" y="0"/>
+          <a:chExt cx="0" cy="0"/>
+        </a:xfrm>
+      </p:grpSpPr>
       <p:pic>
         <p:nvPicPr>
           <p:cNvPr id="23" name="Imagen 22">
@@ -7994,6 +8964,56 @@
           </a:fontRef>
         </p:style>
       </p:cxnSp>
+      <p:sp>
+        <p:nvSpPr>
+          <p:cNvPr id="14" name="CuadroTexto 13">
+            <a:extLst>
+              <a:ext uri="{FF2B5EF4-FFF2-40B4-BE49-F238E27FC236}">
+                <a16:creationId xmlns:a16="http://schemas.microsoft.com/office/drawing/2014/main" id="{B7247518-FC87-43C9-874B-CA7808E024C3}"/>
+              </a:ext>
+            </a:extLst>
+          </p:cNvPr>
+          <p:cNvSpPr txBox="1"/>
+          <p:nvPr/>
+        </p:nvSpPr>
+        <p:spPr>
+          <a:xfrm>
+            <a:off x="7353941" y="96499"/>
+            <a:ext cx="1656223" cy="369332"/>
+          </a:xfrm>
+          <a:prstGeom prst="rect">
+            <a:avLst/>
+          </a:prstGeom>
+        </p:spPr>
+        <p:style>
+          <a:lnRef idx="2">
+            <a:schemeClr val="accent1">
+              <a:shade val="50000"/>
+            </a:schemeClr>
+          </a:lnRef>
+          <a:fillRef idx="1">
+            <a:schemeClr val="accent1"/>
+          </a:fillRef>
+          <a:effectRef idx="0">
+            <a:schemeClr val="accent1"/>
+          </a:effectRef>
+          <a:fontRef idx="minor">
+            <a:schemeClr val="lt1"/>
+          </a:fontRef>
+        </p:style>
+        <p:txBody>
+          <a:bodyPr wrap="square" rtlCol="0">
+            <a:spAutoFit/>
+          </a:bodyPr>
+          <a:lstStyle/>
+          <a:p>
+            <a:r>
+              <a:rPr lang="es-ES" dirty="0"/>
+              <a:t>06-grafico.py</a:t>
+            </a:r>
+          </a:p>
+        </p:txBody>
+      </p:sp>
     </p:spTree>
     <p:extLst>
       <p:ext uri="{BB962C8B-B14F-4D97-AF65-F5344CB8AC3E}">
@@ -8007,7 +9027,7 @@
 </p:sld>
 </file>
 
-<file path=ppt/slides/slide11.xml><?xml version="1.0" encoding="utf-8"?>
+<file path=ppt/slides/slide12.xml><?xml version="1.0" encoding="utf-8"?>
 <p:sld xmlns:a="http://schemas.openxmlformats.org/drawingml/2006/main" xmlns:r="http://schemas.openxmlformats.org/officeDocument/2006/relationships" xmlns:p="http://schemas.openxmlformats.org/presentationml/2006/main">
   <p:cSld>
     <p:spTree>
@@ -8981,6 +10001,56 @@
           </a:p>
         </p:txBody>
       </p:sp>
+      <p:sp>
+        <p:nvSpPr>
+          <p:cNvPr id="3" name="CuadroTexto 2">
+            <a:extLst>
+              <a:ext uri="{FF2B5EF4-FFF2-40B4-BE49-F238E27FC236}">
+                <a16:creationId xmlns:a16="http://schemas.microsoft.com/office/drawing/2014/main" id="{070ADCB9-BD19-47F3-ABD3-B221F1D666F9}"/>
+              </a:ext>
+            </a:extLst>
+          </p:cNvPr>
+          <p:cNvSpPr txBox="1"/>
+          <p:nvPr/>
+        </p:nvSpPr>
+        <p:spPr>
+          <a:xfrm>
+            <a:off x="7488571" y="150068"/>
+            <a:ext cx="1656223" cy="369332"/>
+          </a:xfrm>
+          <a:prstGeom prst="rect">
+            <a:avLst/>
+          </a:prstGeom>
+        </p:spPr>
+        <p:style>
+          <a:lnRef idx="2">
+            <a:schemeClr val="accent1">
+              <a:shade val="50000"/>
+            </a:schemeClr>
+          </a:lnRef>
+          <a:fillRef idx="1">
+            <a:schemeClr val="accent1"/>
+          </a:fillRef>
+          <a:effectRef idx="0">
+            <a:schemeClr val="accent1"/>
+          </a:effectRef>
+          <a:fontRef idx="minor">
+            <a:schemeClr val="lt1"/>
+          </a:fontRef>
+        </p:style>
+        <p:txBody>
+          <a:bodyPr wrap="none" rtlCol="0">
+            <a:spAutoFit/>
+          </a:bodyPr>
+          <a:lstStyle/>
+          <a:p>
+            <a:r>
+              <a:rPr lang="es-ES" dirty="0"/>
+              <a:t>01-primero.py</a:t>
+            </a:r>
+          </a:p>
+        </p:txBody>
+      </p:sp>
     </p:spTree>
     <p:extLst>
       <p:ext uri="{BB962C8B-B14F-4D97-AF65-F5344CB8AC3E}">
@@ -8995,6 +10065,207 @@
 </file>
 
 <file path=ppt/slides/slide3.xml><?xml version="1.0" encoding="utf-8"?>
+<p:sld xmlns:a="http://schemas.openxmlformats.org/drawingml/2006/main" xmlns:r="http://schemas.openxmlformats.org/officeDocument/2006/relationships" xmlns:p="http://schemas.openxmlformats.org/presentationml/2006/main">
+  <p:cSld>
+    <p:spTree>
+      <p:nvGrpSpPr>
+        <p:cNvPr id="1" name=""/>
+        <p:cNvGrpSpPr/>
+        <p:nvPr/>
+      </p:nvGrpSpPr>
+      <p:grpSpPr>
+        <a:xfrm>
+          <a:off x="0" y="0"/>
+          <a:ext cx="0" cy="0"/>
+          <a:chOff x="0" y="0"/>
+          <a:chExt cx="0" cy="0"/>
+        </a:xfrm>
+      </p:grpSpPr>
+      <p:sp>
+        <p:nvSpPr>
+          <p:cNvPr id="2" name="Título 1">
+            <a:extLst>
+              <a:ext uri="{FF2B5EF4-FFF2-40B4-BE49-F238E27FC236}">
+                <a16:creationId xmlns:a16="http://schemas.microsoft.com/office/drawing/2014/main" id="{0A121E66-6290-4492-A436-C69A83FC53B9}"/>
+              </a:ext>
+            </a:extLst>
+          </p:cNvPr>
+          <p:cNvSpPr>
+            <a:spLocks noGrp="1"/>
+          </p:cNvSpPr>
+          <p:nvPr>
+            <p:ph type="title"/>
+          </p:nvPr>
+        </p:nvSpPr>
+        <p:spPr/>
+        <p:txBody>
+          <a:bodyPr/>
+          <a:lstStyle/>
+          <a:p>
+            <a:r>
+              <a:rPr lang="es-ES" dirty="0"/>
+              <a:t>Ejercicio</a:t>
+            </a:r>
+          </a:p>
+        </p:txBody>
+      </p:sp>
+      <p:sp>
+        <p:nvSpPr>
+          <p:cNvPr id="3" name="Marcador de contenido 2">
+            <a:extLst>
+              <a:ext uri="{FF2B5EF4-FFF2-40B4-BE49-F238E27FC236}">
+                <a16:creationId xmlns:a16="http://schemas.microsoft.com/office/drawing/2014/main" id="{505C98D3-F1E2-484F-A1D1-1CC17540B7DB}"/>
+              </a:ext>
+            </a:extLst>
+          </p:cNvPr>
+          <p:cNvSpPr>
+            <a:spLocks noGrp="1"/>
+          </p:cNvSpPr>
+          <p:nvPr>
+            <p:ph idx="1"/>
+          </p:nvPr>
+        </p:nvSpPr>
+        <p:spPr>
+          <a:xfrm>
+            <a:off x="677334" y="1560353"/>
+            <a:ext cx="8596668" cy="4481010"/>
+          </a:xfrm>
+        </p:spPr>
+        <p:txBody>
+          <a:bodyPr>
+            <a:normAutofit fontScale="92500" lnSpcReduction="10000"/>
+          </a:bodyPr>
+          <a:lstStyle/>
+          <a:p>
+            <a:r>
+              <a:rPr lang="es-ES" dirty="0"/>
+              <a:t>Hacer un programa en Python que permita calcular el área de un circulo.</a:t>
+            </a:r>
+          </a:p>
+          <a:p>
+            <a:pPr lvl="1"/>
+            <a:r>
+              <a:rPr lang="es-ES" dirty="0"/>
+              <a:t>El programa debe de pedir al usuario el radio</a:t>
+            </a:r>
+          </a:p>
+          <a:p>
+            <a:pPr lvl="1"/>
+            <a:r>
+              <a:rPr lang="es-ES" dirty="0"/>
+              <a:t>Recordamos que el área de un circulo es PI * radio ** 2 </a:t>
+            </a:r>
+          </a:p>
+          <a:p>
+            <a:pPr lvl="1"/>
+            <a:r>
+              <a:rPr lang="es-ES" dirty="0"/>
+              <a:t>El ** se suele usar para decir elevado al.</a:t>
+            </a:r>
+          </a:p>
+          <a:p>
+            <a:pPr lvl="1"/>
+            <a:endParaRPr lang="es-ES" dirty="0"/>
+          </a:p>
+          <a:p>
+            <a:r>
+              <a:rPr lang="es-ES" dirty="0"/>
+              <a:t>Para ello</a:t>
+            </a:r>
+          </a:p>
+          <a:p>
+            <a:pPr lvl="1"/>
+            <a:r>
+              <a:rPr lang="es-ES" dirty="0"/>
+              <a:t>Abrir el directorio del curso con el Microsoft Visual Studio </a:t>
+            </a:r>
+            <a:r>
+              <a:rPr lang="es-ES" dirty="0" err="1"/>
+              <a:t>Code</a:t>
+            </a:r>
+            <a:r>
+              <a:rPr lang="es-ES" dirty="0"/>
+              <a:t>.</a:t>
+            </a:r>
+          </a:p>
+          <a:p>
+            <a:pPr lvl="2"/>
+            <a:r>
+              <a:rPr lang="es-ES" dirty="0" err="1"/>
+              <a:t>Boton</a:t>
+            </a:r>
+            <a:r>
+              <a:rPr lang="es-ES" dirty="0"/>
+              <a:t> derecho en el administrador de archivos, abrir con </a:t>
+            </a:r>
+            <a:r>
+              <a:rPr lang="es-ES" dirty="0" err="1"/>
+              <a:t>code</a:t>
+            </a:r>
+            <a:endParaRPr lang="es-ES" dirty="0"/>
+          </a:p>
+          <a:p>
+            <a:pPr lvl="1"/>
+            <a:r>
+              <a:rPr lang="es-ES" dirty="0"/>
+              <a:t>Crear una carpeta en el proyecto con vuestro nombre</a:t>
+            </a:r>
+          </a:p>
+          <a:p>
+            <a:pPr lvl="1"/>
+            <a:r>
+              <a:rPr lang="es-ES" dirty="0"/>
+              <a:t>Crear un fichero llamado 01-circulo.py</a:t>
+            </a:r>
+          </a:p>
+          <a:p>
+            <a:pPr lvl="1"/>
+            <a:r>
+              <a:rPr lang="es-ES" dirty="0"/>
+              <a:t>Escribir el programa</a:t>
+            </a:r>
+          </a:p>
+          <a:p>
+            <a:pPr lvl="1"/>
+            <a:r>
+              <a:rPr lang="es-ES" dirty="0"/>
+              <a:t>Tecla F5 para ejecutar.</a:t>
+            </a:r>
+          </a:p>
+          <a:p>
+            <a:pPr lvl="1"/>
+            <a:r>
+              <a:rPr lang="es-ES" sz="2200" dirty="0">
+                <a:solidFill>
+                  <a:schemeClr val="accent2">
+                    <a:lumMod val="60000"/>
+                    <a:lumOff val="40000"/>
+                  </a:schemeClr>
+                </a:solidFill>
+              </a:rPr>
+              <a:t>BUENA SUERTE!</a:t>
+            </a:r>
+          </a:p>
+          <a:p>
+            <a:pPr lvl="1"/>
+            <a:endParaRPr lang="es-ES" dirty="0"/>
+          </a:p>
+        </p:txBody>
+      </p:sp>
+    </p:spTree>
+    <p:extLst>
+      <p:ext uri="{BB962C8B-B14F-4D97-AF65-F5344CB8AC3E}">
+        <p14:creationId xmlns:p14="http://schemas.microsoft.com/office/powerpoint/2010/main" val="987728064"/>
+      </p:ext>
+    </p:extLst>
+  </p:cSld>
+  <p:clrMapOvr>
+    <a:masterClrMapping/>
+  </p:clrMapOvr>
+</p:sld>
+</file>
+
+<file path=ppt/slides/slide4.xml><?xml version="1.0" encoding="utf-8"?>
 <p:sld xmlns:a="http://schemas.openxmlformats.org/drawingml/2006/main" xmlns:r="http://schemas.openxmlformats.org/officeDocument/2006/relationships" xmlns:p="http://schemas.openxmlformats.org/presentationml/2006/main">
   <p:cSld>
     <p:spTree>
@@ -10110,6 +11381,56 @@
           </a:fontRef>
         </p:style>
       </p:cxnSp>
+      <p:sp>
+        <p:nvSpPr>
+          <p:cNvPr id="31" name="CuadroTexto 30">
+            <a:extLst>
+              <a:ext uri="{FF2B5EF4-FFF2-40B4-BE49-F238E27FC236}">
+                <a16:creationId xmlns:a16="http://schemas.microsoft.com/office/drawing/2014/main" id="{E86BA733-5D28-4F42-8DA1-EA8796FBF9DD}"/>
+              </a:ext>
+            </a:extLst>
+          </p:cNvPr>
+          <p:cNvSpPr txBox="1"/>
+          <p:nvPr/>
+        </p:nvSpPr>
+        <p:spPr>
+          <a:xfrm>
+            <a:off x="9495286" y="968911"/>
+            <a:ext cx="1656223" cy="369332"/>
+          </a:xfrm>
+          <a:prstGeom prst="rect">
+            <a:avLst/>
+          </a:prstGeom>
+        </p:spPr>
+        <p:style>
+          <a:lnRef idx="2">
+            <a:schemeClr val="accent1">
+              <a:shade val="50000"/>
+            </a:schemeClr>
+          </a:lnRef>
+          <a:fillRef idx="1">
+            <a:schemeClr val="accent1"/>
+          </a:fillRef>
+          <a:effectRef idx="0">
+            <a:schemeClr val="accent1"/>
+          </a:effectRef>
+          <a:fontRef idx="minor">
+            <a:schemeClr val="lt1"/>
+          </a:fontRef>
+        </p:style>
+        <p:txBody>
+          <a:bodyPr wrap="square" rtlCol="0">
+            <a:spAutoFit/>
+          </a:bodyPr>
+          <a:lstStyle/>
+          <a:p>
+            <a:r>
+              <a:rPr lang="es-ES" dirty="0"/>
+              <a:t>02-bucle.py</a:t>
+            </a:r>
+          </a:p>
+        </p:txBody>
+      </p:sp>
     </p:spTree>
     <p:extLst>
       <p:ext uri="{BB962C8B-B14F-4D97-AF65-F5344CB8AC3E}">
@@ -10123,7 +11444,7 @@
 </p:sld>
 </file>
 
-<file path=ppt/slides/slide4.xml><?xml version="1.0" encoding="utf-8"?>
+<file path=ppt/slides/slide5.xml><?xml version="1.0" encoding="utf-8"?>
 <p:sld xmlns:a="http://schemas.openxmlformats.org/drawingml/2006/main" xmlns:r="http://schemas.openxmlformats.org/officeDocument/2006/relationships" xmlns:p="http://schemas.openxmlformats.org/presentationml/2006/main">
   <p:cSld>
     <p:spTree>
@@ -10307,7 +11628,7 @@
 </p:sld>
 </file>
 
-<file path=ppt/slides/slide5.xml><?xml version="1.0" encoding="utf-8"?>
+<file path=ppt/slides/slide6.xml><?xml version="1.0" encoding="utf-8"?>
 <p:sld xmlns:a="http://schemas.openxmlformats.org/drawingml/2006/main" xmlns:r="http://schemas.openxmlformats.org/officeDocument/2006/relationships" xmlns:p="http://schemas.openxmlformats.org/presentationml/2006/main">
   <p:cSld>
     <p:spTree>
@@ -11019,191 +12340,60 @@
           </a:prstGeom>
         </p:spPr>
       </p:pic>
+      <p:sp>
+        <p:nvSpPr>
+          <p:cNvPr id="19" name="CuadroTexto 18">
+            <a:extLst>
+              <a:ext uri="{FF2B5EF4-FFF2-40B4-BE49-F238E27FC236}">
+                <a16:creationId xmlns:a16="http://schemas.microsoft.com/office/drawing/2014/main" id="{BF9E014F-4B26-4421-A431-64BDEA53C80A}"/>
+              </a:ext>
+            </a:extLst>
+          </p:cNvPr>
+          <p:cNvSpPr txBox="1"/>
+          <p:nvPr/>
+        </p:nvSpPr>
+        <p:spPr>
+          <a:xfrm>
+            <a:off x="208673" y="711177"/>
+            <a:ext cx="1656223" cy="369332"/>
+          </a:xfrm>
+          <a:prstGeom prst="rect">
+            <a:avLst/>
+          </a:prstGeom>
+        </p:spPr>
+        <p:style>
+          <a:lnRef idx="2">
+            <a:schemeClr val="accent1">
+              <a:shade val="50000"/>
+            </a:schemeClr>
+          </a:lnRef>
+          <a:fillRef idx="1">
+            <a:schemeClr val="accent1"/>
+          </a:fillRef>
+          <a:effectRef idx="0">
+            <a:schemeClr val="accent1"/>
+          </a:effectRef>
+          <a:fontRef idx="minor">
+            <a:schemeClr val="lt1"/>
+          </a:fontRef>
+        </p:style>
+        <p:txBody>
+          <a:bodyPr wrap="square" rtlCol="0">
+            <a:spAutoFit/>
+          </a:bodyPr>
+          <a:lstStyle/>
+          <a:p>
+            <a:r>
+              <a:rPr lang="es-ES" dirty="0"/>
+              <a:t>03-if.py</a:t>
+            </a:r>
+          </a:p>
+        </p:txBody>
+      </p:sp>
     </p:spTree>
     <p:extLst>
       <p:ext uri="{BB962C8B-B14F-4D97-AF65-F5344CB8AC3E}">
         <p14:creationId xmlns:p14="http://schemas.microsoft.com/office/powerpoint/2010/main" val="3152617134"/>
-      </p:ext>
-    </p:extLst>
-  </p:cSld>
-  <p:clrMapOvr>
-    <a:masterClrMapping/>
-  </p:clrMapOvr>
-</p:sld>
-</file>
-
-<file path=ppt/slides/slide6.xml><?xml version="1.0" encoding="utf-8"?>
-<p:sld xmlns:a="http://schemas.openxmlformats.org/drawingml/2006/main" xmlns:r="http://schemas.openxmlformats.org/officeDocument/2006/relationships" xmlns:p="http://schemas.openxmlformats.org/presentationml/2006/main">
-  <p:cSld>
-    <p:spTree>
-      <p:nvGrpSpPr>
-        <p:cNvPr id="1" name=""/>
-        <p:cNvGrpSpPr/>
-        <p:nvPr/>
-      </p:nvGrpSpPr>
-      <p:grpSpPr>
-        <a:xfrm>
-          <a:off x="0" y="0"/>
-          <a:ext cx="0" cy="0"/>
-          <a:chOff x="0" y="0"/>
-          <a:chExt cx="0" cy="0"/>
-        </a:xfrm>
-      </p:grpSpPr>
-      <p:sp>
-        <p:nvSpPr>
-          <p:cNvPr id="2" name="Título 1">
-            <a:extLst>
-              <a:ext uri="{FF2B5EF4-FFF2-40B4-BE49-F238E27FC236}">
-                <a16:creationId xmlns:a16="http://schemas.microsoft.com/office/drawing/2014/main" id="{EA3FF9E5-BA4C-43E9-A585-E6D82C877C8F}"/>
-              </a:ext>
-            </a:extLst>
-          </p:cNvPr>
-          <p:cNvSpPr>
-            <a:spLocks noGrp="1"/>
-          </p:cNvSpPr>
-          <p:nvPr>
-            <p:ph type="title"/>
-          </p:nvPr>
-        </p:nvSpPr>
-        <p:spPr/>
-        <p:txBody>
-          <a:bodyPr/>
-          <a:lstStyle/>
-          <a:p>
-            <a:r>
-              <a:rPr lang="es-ES" dirty="0"/>
-              <a:t>Cualquier programa</a:t>
-            </a:r>
-          </a:p>
-        </p:txBody>
-      </p:sp>
-      <p:sp>
-        <p:nvSpPr>
-          <p:cNvPr id="3" name="Marcador de contenido 2">
-            <a:extLst>
-              <a:ext uri="{FF2B5EF4-FFF2-40B4-BE49-F238E27FC236}">
-                <a16:creationId xmlns:a16="http://schemas.microsoft.com/office/drawing/2014/main" id="{83D024D2-DE5A-48F8-B2D4-1C9111B62B2A}"/>
-              </a:ext>
-            </a:extLst>
-          </p:cNvPr>
-          <p:cNvSpPr>
-            <a:spLocks noGrp="1"/>
-          </p:cNvSpPr>
-          <p:nvPr>
-            <p:ph idx="1"/>
-          </p:nvPr>
-        </p:nvSpPr>
-        <p:spPr>
-          <a:xfrm>
-            <a:off x="677334" y="1602297"/>
-            <a:ext cx="9263620" cy="4966283"/>
-          </a:xfrm>
-        </p:spPr>
-        <p:style>
-          <a:lnRef idx="2">
-            <a:schemeClr val="dk1"/>
-          </a:lnRef>
-          <a:fillRef idx="1">
-            <a:schemeClr val="lt1"/>
-          </a:fillRef>
-          <a:effectRef idx="0">
-            <a:schemeClr val="dk1"/>
-          </a:effectRef>
-          <a:fontRef idx="minor">
-            <a:schemeClr val="dk1"/>
-          </a:fontRef>
-        </p:style>
-        <p:txBody>
-          <a:bodyPr>
-            <a:normAutofit/>
-          </a:bodyPr>
-          <a:lstStyle/>
-          <a:p>
-            <a:r>
-              <a:rPr lang="es-ES" dirty="0"/>
-              <a:t>Es una combinación de estructuras</a:t>
-            </a:r>
-          </a:p>
-          <a:p>
-            <a:pPr lvl="1"/>
-            <a:r>
-              <a:rPr lang="es-ES" dirty="0"/>
-              <a:t>Secuencial </a:t>
-            </a:r>
-          </a:p>
-          <a:p>
-            <a:pPr lvl="1"/>
-            <a:r>
-              <a:rPr lang="es-ES" dirty="0"/>
-              <a:t>Iterativa, cíclica, bucles</a:t>
-            </a:r>
-          </a:p>
-          <a:p>
-            <a:pPr lvl="1"/>
-            <a:r>
-              <a:rPr lang="es-ES" dirty="0"/>
-              <a:t>Condicional</a:t>
-            </a:r>
-          </a:p>
-          <a:p>
-            <a:r>
-              <a:rPr lang="es-ES" dirty="0"/>
-              <a:t>Los programas se escriben en un editor.</a:t>
-            </a:r>
-          </a:p>
-          <a:p>
-            <a:r>
-              <a:rPr lang="es-ES" dirty="0"/>
-              <a:t>Y se guardan en el disco</a:t>
-            </a:r>
-          </a:p>
-          <a:p>
-            <a:r>
-              <a:rPr lang="es-ES" dirty="0"/>
-              <a:t>Cuando se ejecutan</a:t>
-            </a:r>
-          </a:p>
-          <a:p>
-            <a:pPr lvl="1"/>
-            <a:r>
-              <a:rPr lang="es-ES" dirty="0"/>
-              <a:t>El sistema operativo lo lleva del disco a la memoria. El programa va en 0 y 1 traducido a lenguaje máquina</a:t>
-            </a:r>
-          </a:p>
-          <a:p>
-            <a:pPr lvl="1"/>
-            <a:r>
-              <a:rPr lang="es-ES" dirty="0"/>
-              <a:t>El sistema empieza la ejecución del programa hasta su fin.</a:t>
-            </a:r>
-          </a:p>
-          <a:p>
-            <a:pPr lvl="1"/>
-            <a:r>
-              <a:rPr lang="es-ES" dirty="0"/>
-              <a:t>El procesador ejecuta las instrucciones elementales apoyándose de la memoria central</a:t>
-            </a:r>
-          </a:p>
-          <a:p>
-            <a:pPr lvl="1"/>
-            <a:r>
-              <a:rPr lang="es-ES" dirty="0"/>
-              <a:t>El sistema usa los periféricos (de entrada / salida) para transmitir datos</a:t>
-            </a:r>
-          </a:p>
-          <a:p>
-            <a:endParaRPr lang="es-ES" dirty="0"/>
-          </a:p>
-          <a:p>
-            <a:pPr lvl="1"/>
-            <a:endParaRPr lang="es-ES" dirty="0"/>
-          </a:p>
-        </p:txBody>
-      </p:sp>
-    </p:spTree>
-    <p:extLst>
-      <p:ext uri="{BB962C8B-B14F-4D97-AF65-F5344CB8AC3E}">
-        <p14:creationId xmlns:p14="http://schemas.microsoft.com/office/powerpoint/2010/main" val="3415225618"/>
       </p:ext>
     </p:extLst>
   </p:cSld>
@@ -11235,7 +12425,7 @@
           <p:cNvPr id="2" name="Título 1">
             <a:extLst>
               <a:ext uri="{FF2B5EF4-FFF2-40B4-BE49-F238E27FC236}">
-                <a16:creationId xmlns:a16="http://schemas.microsoft.com/office/drawing/2014/main" id="{7D823521-7432-4D80-B8C8-8590A2A7D8FF}"/>
+                <a16:creationId xmlns:a16="http://schemas.microsoft.com/office/drawing/2014/main" id="{EA3FF9E5-BA4C-43E9-A585-E6D82C877C8F}"/>
               </a:ext>
             </a:extLst>
           </p:cNvPr>
@@ -11246,110 +12436,39 @@
             <p:ph type="title"/>
           </p:nvPr>
         </p:nvSpPr>
-        <p:spPr>
-          <a:xfrm>
-            <a:off x="677334" y="609600"/>
-            <a:ext cx="8596668" cy="749417"/>
-          </a:xfrm>
-        </p:spPr>
+        <p:spPr/>
         <p:txBody>
           <a:bodyPr/>
           <a:lstStyle/>
           <a:p>
             <a:r>
               <a:rPr lang="es-ES" dirty="0"/>
-              <a:t>Lenguajes de programación</a:t>
-            </a:r>
-          </a:p>
-        </p:txBody>
-      </p:sp>
-      <p:pic>
-        <p:nvPicPr>
-          <p:cNvPr id="4" name="Imagen 3">
+              <a:t>Cualquier programa</a:t>
+            </a:r>
+          </a:p>
+        </p:txBody>
+      </p:sp>
+      <p:sp>
+        <p:nvSpPr>
+          <p:cNvPr id="3" name="Marcador de contenido 2">
             <a:extLst>
               <a:ext uri="{FF2B5EF4-FFF2-40B4-BE49-F238E27FC236}">
-                <a16:creationId xmlns:a16="http://schemas.microsoft.com/office/drawing/2014/main" id="{1514464C-89AF-4E24-808D-439C742E3E68}"/>
+                <a16:creationId xmlns:a16="http://schemas.microsoft.com/office/drawing/2014/main" id="{83D024D2-DE5A-48F8-B2D4-1C9111B62B2A}"/>
               </a:ext>
             </a:extLst>
           </p:cNvPr>
-          <p:cNvPicPr>
-            <a:picLocks noChangeAspect="1"/>
-          </p:cNvPicPr>
-          <p:nvPr/>
-        </p:nvPicPr>
-        <p:blipFill>
-          <a:blip r:embed="rId2"/>
-          <a:stretch>
-            <a:fillRect/>
-          </a:stretch>
-        </p:blipFill>
+          <p:cNvSpPr>
+            <a:spLocks noGrp="1"/>
+          </p:cNvSpPr>
+          <p:nvPr>
+            <p:ph idx="1"/>
+          </p:nvPr>
+        </p:nvSpPr>
         <p:spPr>
           <a:xfrm>
-            <a:off x="752835" y="1275127"/>
-            <a:ext cx="6763701" cy="5392803"/>
-          </a:xfrm>
-          <a:prstGeom prst="rect">
-            <a:avLst/>
-          </a:prstGeom>
-        </p:spPr>
-      </p:pic>
-      <p:sp>
-        <p:nvSpPr>
-          <p:cNvPr id="5" name="Rectángulo 4">
-            <a:extLst>
-              <a:ext uri="{FF2B5EF4-FFF2-40B4-BE49-F238E27FC236}">
-                <a16:creationId xmlns:a16="http://schemas.microsoft.com/office/drawing/2014/main" id="{7EE0EFA5-0B73-4629-A7CD-7AFE6065ABA3}"/>
-              </a:ext>
-            </a:extLst>
-          </p:cNvPr>
-          <p:cNvSpPr/>
-          <p:nvPr/>
-        </p:nvSpPr>
-        <p:spPr>
-          <a:xfrm>
-            <a:off x="677334" y="6483264"/>
-            <a:ext cx="4095608" cy="369332"/>
-          </a:xfrm>
-          <a:prstGeom prst="rect">
-            <a:avLst/>
-          </a:prstGeom>
-        </p:spPr>
-        <p:txBody>
-          <a:bodyPr wrap="none">
-            <a:spAutoFit/>
-          </a:bodyPr>
-          <a:lstStyle/>
-          <a:p>
-            <a:r>
-              <a:rPr lang="es-ES" dirty="0">
-                <a:hlinkClick r:id="rId3"/>
-              </a:rPr>
-              <a:t>https://www.tiobe.com/tiobe-index/</a:t>
-            </a:r>
-            <a:endParaRPr lang="es-ES" dirty="0"/>
-          </a:p>
-        </p:txBody>
-      </p:sp>
-      <p:sp>
-        <p:nvSpPr>
-          <p:cNvPr id="6" name="CuadroTexto 5">
-            <a:extLst>
-              <a:ext uri="{FF2B5EF4-FFF2-40B4-BE49-F238E27FC236}">
-                <a16:creationId xmlns:a16="http://schemas.microsoft.com/office/drawing/2014/main" id="{BF14EF5E-489B-419D-A028-9436EA485B65}"/>
-              </a:ext>
-            </a:extLst>
-          </p:cNvPr>
-          <p:cNvSpPr txBox="1"/>
-          <p:nvPr/>
-        </p:nvSpPr>
-        <p:spPr>
-          <a:xfrm>
-            <a:off x="8372213" y="843677"/>
-            <a:ext cx="2895408" cy="3139321"/>
-          </a:xfrm>
-          <a:prstGeom prst="rect">
-            <a:avLst/>
-          </a:prstGeom>
+            <a:off x="677334" y="1602297"/>
+            <a:ext cx="9263620" cy="4966283"/>
+          </a:xfrm>
         </p:spPr>
         <p:style>
           <a:lnRef idx="2">
@@ -11366,117 +12485,96 @@
           </a:fontRef>
         </p:style>
         <p:txBody>
-          <a:bodyPr wrap="none" rtlCol="0">
-            <a:spAutoFit/>
+          <a:bodyPr>
+            <a:normAutofit/>
           </a:bodyPr>
           <a:lstStyle/>
           <a:p>
-            <a:pPr algn="ctr"/>
             <a:r>
               <a:rPr lang="es-ES" dirty="0"/>
-              <a:t>En GTT</a:t>
-            </a:r>
-          </a:p>
-          <a:p>
+              <a:t>Es una combinación de estructuras</a:t>
+            </a:r>
+          </a:p>
+          <a:p>
+            <a:pPr lvl="1"/>
             <a:r>
               <a:rPr lang="es-ES" dirty="0"/>
-              <a:t>C# </a:t>
-            </a:r>
-          </a:p>
-          <a:p>
-            <a:pPr marL="800100" lvl="1" indent="-342900">
-              <a:buFont typeface="+mj-lt"/>
-              <a:buAutoNum type="arabicPeriod"/>
-            </a:pPr>
+              <a:t>Secuencial </a:t>
+            </a:r>
+          </a:p>
+          <a:p>
+            <a:pPr lvl="1"/>
             <a:r>
               <a:rPr lang="es-ES" dirty="0"/>
-              <a:t>la NI</a:t>
-            </a:r>
-          </a:p>
-          <a:p>
-            <a:pPr marL="800100" lvl="1" indent="-342900">
-              <a:buFont typeface="+mj-lt"/>
-              <a:buAutoNum type="arabicPeriod"/>
-            </a:pPr>
+              <a:t>Iterativa, cíclica, bucles</a:t>
+            </a:r>
+          </a:p>
+          <a:p>
+            <a:pPr lvl="1"/>
             <a:r>
               <a:rPr lang="es-ES" dirty="0"/>
-              <a:t>Los Web </a:t>
-            </a:r>
-            <a:r>
-              <a:rPr lang="es-ES" dirty="0" err="1"/>
-              <a:t>Services</a:t>
-            </a:r>
+              <a:t>Condicional</a:t>
+            </a:r>
+          </a:p>
+          <a:p>
+            <a:r>
+              <a:rPr lang="es-ES" dirty="0"/>
+              <a:t>Los programas se escriben en un editor.</a:t>
+            </a:r>
+          </a:p>
+          <a:p>
+            <a:r>
+              <a:rPr lang="es-ES" dirty="0"/>
+              <a:t>Y se guardan en el disco</a:t>
+            </a:r>
+          </a:p>
+          <a:p>
+            <a:r>
+              <a:rPr lang="es-ES" dirty="0"/>
+              <a:t>Cuando se ejecutan</a:t>
+            </a:r>
+          </a:p>
+          <a:p>
+            <a:pPr lvl="1"/>
+            <a:r>
+              <a:rPr lang="es-ES" dirty="0"/>
+              <a:t>El sistema operativo lo lleva del disco a la memoria. El programa va en 0 y 1 traducido a lenguaje máquina</a:t>
+            </a:r>
+          </a:p>
+          <a:p>
+            <a:pPr lvl="1"/>
+            <a:r>
+              <a:rPr lang="es-ES" dirty="0"/>
+              <a:t>El sistema empieza la ejecución del programa hasta su fin.</a:t>
+            </a:r>
+          </a:p>
+          <a:p>
+            <a:pPr lvl="1"/>
+            <a:r>
+              <a:rPr lang="es-ES" dirty="0"/>
+              <a:t>El procesador ejecuta las instrucciones elementales apoyándose de la memoria central</a:t>
+            </a:r>
+          </a:p>
+          <a:p>
+            <a:pPr lvl="1"/>
+            <a:r>
+              <a:rPr lang="es-ES" dirty="0"/>
+              <a:t>El sistema usa los periféricos (de entrada / salida) para transmitir datos</a:t>
+            </a:r>
+          </a:p>
+          <a:p>
             <a:endParaRPr lang="es-ES" dirty="0"/>
           </a:p>
           <a:p>
-            <a:r>
-              <a:rPr lang="es-ES" dirty="0" err="1"/>
-              <a:t>Javascript</a:t>
-            </a:r>
+            <a:pPr lvl="1"/>
             <a:endParaRPr lang="es-ES" dirty="0"/>
-          </a:p>
-          <a:p>
-            <a:pPr marL="800100" lvl="1" indent="-342900">
-              <a:buFont typeface="+mj-lt"/>
-              <a:buAutoNum type="arabicPeriod"/>
-            </a:pPr>
-            <a:r>
-              <a:rPr lang="es-ES" dirty="0"/>
-              <a:t>Antigua Aplicación</a:t>
-            </a:r>
-          </a:p>
-          <a:p>
-            <a:pPr marL="800100" lvl="1" indent="-342900">
-              <a:buFont typeface="+mj-lt"/>
-              <a:buAutoNum type="arabicPeriod"/>
-            </a:pPr>
-            <a:r>
-              <a:rPr lang="es-ES" dirty="0"/>
-              <a:t>OVT</a:t>
-            </a:r>
-          </a:p>
-          <a:p>
-            <a:pPr marL="800100" lvl="1" indent="-342900">
-              <a:buFont typeface="+mj-lt"/>
-              <a:buAutoNum type="arabicPeriod"/>
-            </a:pPr>
-            <a:r>
-              <a:rPr lang="es-ES" dirty="0"/>
-              <a:t>Navegadores</a:t>
-            </a:r>
-          </a:p>
-          <a:p>
-            <a:r>
-              <a:rPr lang="es-ES" dirty="0"/>
-              <a:t>Base de datos</a:t>
-            </a:r>
-          </a:p>
-          <a:p>
-            <a:pPr marL="800100" lvl="1" indent="-342900">
-              <a:buFont typeface="+mj-lt"/>
-              <a:buAutoNum type="arabicPeriod"/>
-            </a:pPr>
-            <a:r>
-              <a:rPr lang="es-ES" dirty="0"/>
-              <a:t>SQL</a:t>
-            </a:r>
-          </a:p>
-          <a:p>
-            <a:pPr marL="800100" lvl="1" indent="-342900">
-              <a:buFont typeface="+mj-lt"/>
-              <a:buAutoNum type="arabicPeriod"/>
-            </a:pPr>
-            <a:r>
-              <a:rPr lang="es-ES" dirty="0"/>
-              <a:t>PL/SQL</a:t>
-            </a:r>
           </a:p>
         </p:txBody>
       </p:sp>
     </p:spTree>
     <p:extLst>
       <p:ext uri="{BB962C8B-B14F-4D97-AF65-F5344CB8AC3E}">
-        <p14:creationId xmlns:p14="http://schemas.microsoft.com/office/powerpoint/2010/main" val="3935209040"/>
+        <p14:creationId xmlns:p14="http://schemas.microsoft.com/office/powerpoint/2010/main" val="3415225618"/>
       </p:ext>
     </p:extLst>
   </p:cSld>
@@ -11508,7 +12606,7 @@
           <p:cNvPr id="2" name="Título 1">
             <a:extLst>
               <a:ext uri="{FF2B5EF4-FFF2-40B4-BE49-F238E27FC236}">
-                <a16:creationId xmlns:a16="http://schemas.microsoft.com/office/drawing/2014/main" id="{BC0C1C2F-5E80-4031-9A91-1BC95CCB7B8A}"/>
+                <a16:creationId xmlns:a16="http://schemas.microsoft.com/office/drawing/2014/main" id="{7D823521-7432-4D80-B8C8-8590A2A7D8FF}"/>
               </a:ext>
             </a:extLst>
           </p:cNvPr>
@@ -11521,29 +12619,27 @@
         </p:nvSpPr>
         <p:spPr>
           <a:xfrm>
-            <a:off x="81716" y="53596"/>
-            <a:ext cx="5757022" cy="598415"/>
-          </a:xfrm>
-        </p:spPr>
-        <p:txBody>
-          <a:bodyPr>
-            <a:normAutofit fontScale="90000"/>
-          </a:bodyPr>
+            <a:off x="677334" y="609600"/>
+            <a:ext cx="8596668" cy="749417"/>
+          </a:xfrm>
+        </p:spPr>
+        <p:txBody>
+          <a:bodyPr/>
           <a:lstStyle/>
           <a:p>
             <a:r>
               <a:rPr lang="es-ES" dirty="0"/>
-              <a:t>¿Qué hace este programa</a:t>
+              <a:t>Lenguajes de programación</a:t>
             </a:r>
           </a:p>
         </p:txBody>
       </p:sp>
       <p:pic>
         <p:nvPicPr>
-          <p:cNvPr id="5" name="Imagen 4">
+          <p:cNvPr id="4" name="Imagen 3">
             <a:extLst>
               <a:ext uri="{FF2B5EF4-FFF2-40B4-BE49-F238E27FC236}">
-                <a16:creationId xmlns:a16="http://schemas.microsoft.com/office/drawing/2014/main" id="{778961C3-6ED2-49D3-86B8-06827C0C648A}"/>
+                <a16:creationId xmlns:a16="http://schemas.microsoft.com/office/drawing/2014/main" id="{1514464C-89AF-4E24-808D-439C742E3E68}"/>
               </a:ext>
             </a:extLst>
           </p:cNvPr>
@@ -11560,50 +12656,57 @@
         </p:blipFill>
         <p:spPr>
           <a:xfrm>
-            <a:off x="81716" y="749883"/>
-            <a:ext cx="9914286" cy="3828571"/>
+            <a:off x="752835" y="1275127"/>
+            <a:ext cx="6763701" cy="5392803"/>
           </a:xfrm>
           <a:prstGeom prst="rect">
             <a:avLst/>
           </a:prstGeom>
         </p:spPr>
       </p:pic>
-      <p:pic>
-        <p:nvPicPr>
-          <p:cNvPr id="6" name="Imagen 5">
+      <p:sp>
+        <p:nvSpPr>
+          <p:cNvPr id="5" name="Rectángulo 4">
             <a:extLst>
               <a:ext uri="{FF2B5EF4-FFF2-40B4-BE49-F238E27FC236}">
-                <a16:creationId xmlns:a16="http://schemas.microsoft.com/office/drawing/2014/main" id="{496AF44A-0165-437F-B456-3EBF070EF585}"/>
+                <a16:creationId xmlns:a16="http://schemas.microsoft.com/office/drawing/2014/main" id="{7EE0EFA5-0B73-4629-A7CD-7AFE6065ABA3}"/>
               </a:ext>
             </a:extLst>
           </p:cNvPr>
-          <p:cNvPicPr>
-            <a:picLocks noChangeAspect="1"/>
-          </p:cNvPicPr>
+          <p:cNvSpPr/>
           <p:nvPr/>
-        </p:nvPicPr>
-        <p:blipFill>
-          <a:blip r:embed="rId3"/>
-          <a:stretch>
-            <a:fillRect/>
-          </a:stretch>
-        </p:blipFill>
+        </p:nvSpPr>
         <p:spPr>
           <a:xfrm>
-            <a:off x="8258628" y="4375124"/>
-            <a:ext cx="3933372" cy="2482876"/>
+            <a:off x="677334" y="6483264"/>
+            <a:ext cx="4095608" cy="369332"/>
           </a:xfrm>
           <a:prstGeom prst="rect">
             <a:avLst/>
           </a:prstGeom>
         </p:spPr>
-      </p:pic>
-      <p:sp>
-        <p:nvSpPr>
-          <p:cNvPr id="7" name="CuadroTexto 6">
+        <p:txBody>
+          <a:bodyPr wrap="none">
+            <a:spAutoFit/>
+          </a:bodyPr>
+          <a:lstStyle/>
+          <a:p>
+            <a:r>
+              <a:rPr lang="es-ES" dirty="0">
+                <a:hlinkClick r:id="rId3"/>
+              </a:rPr>
+              <a:t>https://www.tiobe.com/tiobe-index/</a:t>
+            </a:r>
+            <a:endParaRPr lang="es-ES" dirty="0"/>
+          </a:p>
+        </p:txBody>
+      </p:sp>
+      <p:sp>
+        <p:nvSpPr>
+          <p:cNvPr id="6" name="CuadroTexto 5">
             <a:extLst>
               <a:ext uri="{FF2B5EF4-FFF2-40B4-BE49-F238E27FC236}">
-                <a16:creationId xmlns:a16="http://schemas.microsoft.com/office/drawing/2014/main" id="{B9581936-2603-4E8E-B14F-7E9C302BDF04}"/>
+                <a16:creationId xmlns:a16="http://schemas.microsoft.com/office/drawing/2014/main" id="{BF14EF5E-489B-419D-A028-9436EA485B65}"/>
               </a:ext>
             </a:extLst>
           </p:cNvPr>
@@ -11612,84 +12715,8 @@
         </p:nvSpPr>
         <p:spPr>
           <a:xfrm>
-            <a:off x="4469179" y="5989739"/>
-            <a:ext cx="2632452" cy="369332"/>
-          </a:xfrm>
-          <a:prstGeom prst="rect">
-            <a:avLst/>
-          </a:prstGeom>
-          <a:noFill/>
-        </p:spPr>
-        <p:txBody>
-          <a:bodyPr wrap="none" rtlCol="0">
-            <a:spAutoFit/>
-          </a:bodyPr>
-          <a:lstStyle/>
-          <a:p>
-            <a:r>
-              <a:rPr lang="es-ES" dirty="0"/>
-              <a:t>Ejecución del programa</a:t>
-            </a:r>
-          </a:p>
-        </p:txBody>
-      </p:sp>
-      <p:cxnSp>
-        <p:nvCxnSpPr>
-          <p:cNvPr id="9" name="Conector recto de flecha 8">
-            <a:extLst>
-              <a:ext uri="{FF2B5EF4-FFF2-40B4-BE49-F238E27FC236}">
-                <a16:creationId xmlns:a16="http://schemas.microsoft.com/office/drawing/2014/main" id="{87BF4D44-8A9F-4ACC-AFF3-E5E4B12711F3}"/>
-              </a:ext>
-            </a:extLst>
-          </p:cNvPr>
-          <p:cNvCxnSpPr>
-            <a:cxnSpLocks/>
-          </p:cNvCxnSpPr>
-          <p:nvPr/>
-        </p:nvCxnSpPr>
-        <p:spPr>
-          <a:xfrm flipV="1">
-            <a:off x="6979640" y="5746460"/>
-            <a:ext cx="947956" cy="268446"/>
-          </a:xfrm>
-          <a:prstGeom prst="straightConnector1">
-            <a:avLst/>
-          </a:prstGeom>
-          <a:ln>
-            <a:tailEnd type="triangle"/>
-          </a:ln>
-        </p:spPr>
-        <p:style>
-          <a:lnRef idx="1">
-            <a:schemeClr val="accent1"/>
-          </a:lnRef>
-          <a:fillRef idx="0">
-            <a:schemeClr val="accent1"/>
-          </a:fillRef>
-          <a:effectRef idx="0">
-            <a:schemeClr val="accent1"/>
-          </a:effectRef>
-          <a:fontRef idx="minor">
-            <a:schemeClr val="tx1"/>
-          </a:fontRef>
-        </p:style>
-      </p:cxnSp>
-      <p:sp>
-        <p:nvSpPr>
-          <p:cNvPr id="11" name="CuadroTexto 10">
-            <a:extLst>
-              <a:ext uri="{FF2B5EF4-FFF2-40B4-BE49-F238E27FC236}">
-                <a16:creationId xmlns:a16="http://schemas.microsoft.com/office/drawing/2014/main" id="{6B9A8F25-A13C-46E7-A9B5-5A6785A98B06}"/>
-              </a:ext>
-            </a:extLst>
-          </p:cNvPr>
-          <p:cNvSpPr txBox="1"/>
-          <p:nvPr/>
-        </p:nvSpPr>
-        <p:spPr>
-          <a:xfrm>
-            <a:off x="6727971" y="1887524"/>
-            <a:ext cx="747320" cy="369332"/>
+            <a:off x="8372213" y="843677"/>
+            <a:ext cx="2895408" cy="3139321"/>
           </a:xfrm>
           <a:prstGeom prst="rect">
             <a:avLst/>
@@ -11715,322 +12742,112 @@
           </a:bodyPr>
           <a:lstStyle/>
           <a:p>
+            <a:pPr algn="ctr"/>
             <a:r>
               <a:rPr lang="es-ES" dirty="0"/>
-              <a:t>bucle</a:t>
-            </a:r>
-          </a:p>
-        </p:txBody>
-      </p:sp>
-      <p:cxnSp>
-        <p:nvCxnSpPr>
-          <p:cNvPr id="13" name="Conector recto de flecha 12">
-            <a:extLst>
-              <a:ext uri="{FF2B5EF4-FFF2-40B4-BE49-F238E27FC236}">
-                <a16:creationId xmlns:a16="http://schemas.microsoft.com/office/drawing/2014/main" id="{B7320C04-97B1-4507-86C3-716227F40BB4}"/>
-              </a:ext>
-            </a:extLst>
-          </p:cNvPr>
-          <p:cNvCxnSpPr/>
-          <p:nvPr/>
-        </p:nvCxnSpPr>
-        <p:spPr>
-          <a:xfrm flipH="1">
-            <a:off x="4689446" y="2063692"/>
-            <a:ext cx="1812022" cy="0"/>
-          </a:xfrm>
-          <a:prstGeom prst="straightConnector1">
-            <a:avLst/>
-          </a:prstGeom>
-          <a:ln>
-            <a:tailEnd type="triangle"/>
-          </a:ln>
-        </p:spPr>
-        <p:style>
-          <a:lnRef idx="1">
-            <a:schemeClr val="accent1"/>
-          </a:lnRef>
-          <a:fillRef idx="0">
-            <a:schemeClr val="accent1"/>
-          </a:fillRef>
-          <a:effectRef idx="0">
-            <a:schemeClr val="accent1"/>
-          </a:effectRef>
-          <a:fontRef idx="minor">
-            <a:schemeClr val="tx1"/>
-          </a:fontRef>
-        </p:style>
-      </p:cxnSp>
-      <p:sp>
-        <p:nvSpPr>
-          <p:cNvPr id="15" name="CuadroTexto 14">
-            <a:extLst>
-              <a:ext uri="{FF2B5EF4-FFF2-40B4-BE49-F238E27FC236}">
-                <a16:creationId xmlns:a16="http://schemas.microsoft.com/office/drawing/2014/main" id="{F240794B-3123-400C-8416-E0075EB7B856}"/>
-              </a:ext>
-            </a:extLst>
-          </p:cNvPr>
-          <p:cNvSpPr txBox="1"/>
-          <p:nvPr/>
-        </p:nvSpPr>
-        <p:spPr>
-          <a:xfrm>
-            <a:off x="7884968" y="2258702"/>
-            <a:ext cx="1172116" cy="369332"/>
-          </a:xfrm>
-          <a:prstGeom prst="rect">
-            <a:avLst/>
-          </a:prstGeom>
-        </p:spPr>
-        <p:style>
-          <a:lnRef idx="2">
-            <a:schemeClr val="dk1"/>
-          </a:lnRef>
-          <a:fillRef idx="1">
-            <a:schemeClr val="lt1"/>
-          </a:fillRef>
-          <a:effectRef idx="0">
-            <a:schemeClr val="dk1"/>
-          </a:effectRef>
-          <a:fontRef idx="minor">
-            <a:schemeClr val="dk1"/>
-          </a:fontRef>
-        </p:style>
-        <p:txBody>
-          <a:bodyPr wrap="none" rtlCol="0">
-            <a:spAutoFit/>
-          </a:bodyPr>
-          <a:lstStyle/>
+              <a:t>En GTT</a:t>
+            </a:r>
+          </a:p>
           <a:p>
             <a:r>
               <a:rPr lang="es-ES" dirty="0"/>
-              <a:t>condición</a:t>
-            </a:r>
-          </a:p>
-        </p:txBody>
-      </p:sp>
-      <p:cxnSp>
-        <p:nvCxnSpPr>
-          <p:cNvPr id="17" name="Conector recto de flecha 16">
-            <a:extLst>
-              <a:ext uri="{FF2B5EF4-FFF2-40B4-BE49-F238E27FC236}">
-                <a16:creationId xmlns:a16="http://schemas.microsoft.com/office/drawing/2014/main" id="{363AAAD0-8146-4AB6-A09E-F9F49C6C21CC}"/>
-              </a:ext>
-            </a:extLst>
-          </p:cNvPr>
-          <p:cNvCxnSpPr>
-            <a:cxnSpLocks/>
-          </p:cNvCxnSpPr>
-          <p:nvPr/>
-        </p:nvCxnSpPr>
-        <p:spPr>
-          <a:xfrm flipH="1">
-            <a:off x="4689446" y="2482876"/>
-            <a:ext cx="3137482" cy="0"/>
-          </a:xfrm>
-          <a:prstGeom prst="straightConnector1">
-            <a:avLst/>
-          </a:prstGeom>
-          <a:ln>
-            <a:tailEnd type="triangle"/>
-          </a:ln>
-        </p:spPr>
-        <p:style>
-          <a:lnRef idx="1">
-            <a:schemeClr val="accent1"/>
-          </a:lnRef>
-          <a:fillRef idx="0">
-            <a:schemeClr val="accent1"/>
-          </a:fillRef>
-          <a:effectRef idx="0">
-            <a:schemeClr val="accent1"/>
-          </a:effectRef>
-          <a:fontRef idx="minor">
-            <a:schemeClr val="tx1"/>
-          </a:fontRef>
-        </p:style>
-      </p:cxnSp>
-      <p:sp>
-        <p:nvSpPr>
-          <p:cNvPr id="20" name="CuadroTexto 19">
-            <a:extLst>
-              <a:ext uri="{FF2B5EF4-FFF2-40B4-BE49-F238E27FC236}">
-                <a16:creationId xmlns:a16="http://schemas.microsoft.com/office/drawing/2014/main" id="{E676CFF7-2AA6-47A3-BBB9-8C9A26DE026F}"/>
-              </a:ext>
-            </a:extLst>
-          </p:cNvPr>
-          <p:cNvSpPr txBox="1"/>
-          <p:nvPr/>
-        </p:nvSpPr>
-        <p:spPr>
-          <a:xfrm>
-            <a:off x="7531345" y="757306"/>
-            <a:ext cx="939681" cy="369332"/>
-          </a:xfrm>
-          <a:prstGeom prst="rect">
-            <a:avLst/>
-          </a:prstGeom>
-        </p:spPr>
-        <p:style>
-          <a:lnRef idx="2">
-            <a:schemeClr val="dk1"/>
-          </a:lnRef>
-          <a:fillRef idx="1">
-            <a:schemeClr val="lt1"/>
-          </a:fillRef>
-          <a:effectRef idx="0">
-            <a:schemeClr val="dk1"/>
-          </a:effectRef>
-          <a:fontRef idx="minor">
-            <a:schemeClr val="dk1"/>
-          </a:fontRef>
-        </p:style>
-        <p:txBody>
-          <a:bodyPr wrap="none" rtlCol="0">
-            <a:spAutoFit/>
-          </a:bodyPr>
-          <a:lstStyle/>
-          <a:p>
+              <a:t>C# </a:t>
+            </a:r>
+          </a:p>
+          <a:p>
+            <a:pPr marL="800100" lvl="1" indent="-342900">
+              <a:buFont typeface="+mj-lt"/>
+              <a:buAutoNum type="arabicPeriod"/>
+            </a:pPr>
+            <a:r>
+              <a:rPr lang="es-ES" dirty="0"/>
+              <a:t>la NI</a:t>
+            </a:r>
+          </a:p>
+          <a:p>
+            <a:pPr marL="800100" lvl="1" indent="-342900">
+              <a:buFont typeface="+mj-lt"/>
+              <a:buAutoNum type="arabicPeriod"/>
+            </a:pPr>
+            <a:r>
+              <a:rPr lang="es-ES" dirty="0"/>
+              <a:t>Los Web </a:t>
+            </a:r>
             <a:r>
               <a:rPr lang="es-ES" dirty="0" err="1"/>
-              <a:t>libreria</a:t>
+              <a:t>Services</a:t>
             </a:r>
             <a:endParaRPr lang="es-ES" dirty="0"/>
           </a:p>
-        </p:txBody>
-      </p:sp>
-      <p:cxnSp>
-        <p:nvCxnSpPr>
-          <p:cNvPr id="22" name="Conector recto de flecha 21">
-            <a:extLst>
-              <a:ext uri="{FF2B5EF4-FFF2-40B4-BE49-F238E27FC236}">
-                <a16:creationId xmlns:a16="http://schemas.microsoft.com/office/drawing/2014/main" id="{D21812F8-02CB-486D-9C99-DD655A910BDB}"/>
-              </a:ext>
-            </a:extLst>
-          </p:cNvPr>
-          <p:cNvCxnSpPr>
-            <a:cxnSpLocks/>
-          </p:cNvCxnSpPr>
-          <p:nvPr/>
-        </p:nvCxnSpPr>
-        <p:spPr>
-          <a:xfrm flipH="1">
-            <a:off x="3229761" y="922789"/>
-            <a:ext cx="4223857" cy="0"/>
-          </a:xfrm>
-          <a:prstGeom prst="straightConnector1">
-            <a:avLst/>
-          </a:prstGeom>
-          <a:ln>
-            <a:tailEnd type="triangle"/>
-          </a:ln>
-        </p:spPr>
-        <p:style>
-          <a:lnRef idx="1">
-            <a:schemeClr val="accent1"/>
-          </a:lnRef>
-          <a:fillRef idx="0">
-            <a:schemeClr val="accent1"/>
-          </a:fillRef>
-          <a:effectRef idx="0">
-            <a:schemeClr val="accent1"/>
-          </a:effectRef>
-          <a:fontRef idx="minor">
-            <a:schemeClr val="tx1"/>
-          </a:fontRef>
-        </p:style>
-      </p:cxnSp>
-      <p:sp>
-        <p:nvSpPr>
-          <p:cNvPr id="24" name="CuadroTexto 23">
-            <a:extLst>
-              <a:ext uri="{FF2B5EF4-FFF2-40B4-BE49-F238E27FC236}">
-                <a16:creationId xmlns:a16="http://schemas.microsoft.com/office/drawing/2014/main" id="{FE1007B7-6125-43A3-A943-181F4E018163}"/>
-              </a:ext>
-            </a:extLst>
-          </p:cNvPr>
-          <p:cNvSpPr txBox="1"/>
-          <p:nvPr/>
-        </p:nvSpPr>
-        <p:spPr>
-          <a:xfrm>
-            <a:off x="7531345" y="1159312"/>
-            <a:ext cx="2121093" cy="369332"/>
-          </a:xfrm>
-          <a:prstGeom prst="rect">
-            <a:avLst/>
-          </a:prstGeom>
-        </p:spPr>
-        <p:style>
-          <a:lnRef idx="2">
-            <a:schemeClr val="dk1"/>
-          </a:lnRef>
-          <a:fillRef idx="1">
-            <a:schemeClr val="lt1"/>
-          </a:fillRef>
-          <a:effectRef idx="0">
-            <a:schemeClr val="dk1"/>
-          </a:effectRef>
-          <a:fontRef idx="minor">
-            <a:schemeClr val="dk1"/>
-          </a:fontRef>
-        </p:style>
-        <p:txBody>
-          <a:bodyPr wrap="none" rtlCol="0">
-            <a:spAutoFit/>
-          </a:bodyPr>
-          <a:lstStyle/>
-          <a:p>
+          <a:p>
+            <a:r>
+              <a:rPr lang="es-ES" dirty="0" err="1"/>
+              <a:t>Javascript</a:t>
+            </a:r>
+            <a:endParaRPr lang="es-ES" dirty="0"/>
+          </a:p>
+          <a:p>
+            <a:pPr marL="800100" lvl="1" indent="-342900">
+              <a:buFont typeface="+mj-lt"/>
+              <a:buAutoNum type="arabicPeriod"/>
+            </a:pPr>
             <a:r>
               <a:rPr lang="es-ES" dirty="0"/>
-              <a:t>Elige entre 1 y 100</a:t>
-            </a:r>
-          </a:p>
-        </p:txBody>
-      </p:sp>
-      <p:cxnSp>
-        <p:nvCxnSpPr>
-          <p:cNvPr id="26" name="Conector recto de flecha 25">
-            <a:extLst>
-              <a:ext uri="{FF2B5EF4-FFF2-40B4-BE49-F238E27FC236}">
-                <a16:creationId xmlns:a16="http://schemas.microsoft.com/office/drawing/2014/main" id="{F3F8E349-4762-4551-97A4-5920CA005A40}"/>
-              </a:ext>
-            </a:extLst>
-          </p:cNvPr>
-          <p:cNvCxnSpPr/>
-          <p:nvPr/>
-        </p:nvCxnSpPr>
-        <p:spPr>
-          <a:xfrm flipH="1">
-            <a:off x="5595457" y="1314870"/>
-            <a:ext cx="1644242" cy="0"/>
-          </a:xfrm>
-          <a:prstGeom prst="straightConnector1">
-            <a:avLst/>
-          </a:prstGeom>
-          <a:ln>
-            <a:tailEnd type="triangle"/>
-          </a:ln>
-        </p:spPr>
-        <p:style>
-          <a:lnRef idx="1">
-            <a:schemeClr val="accent1"/>
-          </a:lnRef>
-          <a:fillRef idx="0">
-            <a:schemeClr val="accent1"/>
-          </a:fillRef>
-          <a:effectRef idx="0">
-            <a:schemeClr val="accent1"/>
-          </a:effectRef>
-          <a:fontRef idx="minor">
-            <a:schemeClr val="tx1"/>
-          </a:fontRef>
-        </p:style>
-      </p:cxnSp>
+              <a:t>Antigua Aplicación</a:t>
+            </a:r>
+          </a:p>
+          <a:p>
+            <a:pPr marL="800100" lvl="1" indent="-342900">
+              <a:buFont typeface="+mj-lt"/>
+              <a:buAutoNum type="arabicPeriod"/>
+            </a:pPr>
+            <a:r>
+              <a:rPr lang="es-ES" dirty="0"/>
+              <a:t>OVT</a:t>
+            </a:r>
+          </a:p>
+          <a:p>
+            <a:pPr marL="800100" lvl="1" indent="-342900">
+              <a:buFont typeface="+mj-lt"/>
+              <a:buAutoNum type="arabicPeriod"/>
+            </a:pPr>
+            <a:r>
+              <a:rPr lang="es-ES" dirty="0"/>
+              <a:t>Navegadores</a:t>
+            </a:r>
+          </a:p>
+          <a:p>
+            <a:r>
+              <a:rPr lang="es-ES" dirty="0"/>
+              <a:t>Base de datos</a:t>
+            </a:r>
+          </a:p>
+          <a:p>
+            <a:pPr marL="800100" lvl="1" indent="-342900">
+              <a:buFont typeface="+mj-lt"/>
+              <a:buAutoNum type="arabicPeriod"/>
+            </a:pPr>
+            <a:r>
+              <a:rPr lang="es-ES" dirty="0"/>
+              <a:t>SQL</a:t>
+            </a:r>
+          </a:p>
+          <a:p>
+            <a:pPr marL="800100" lvl="1" indent="-342900">
+              <a:buFont typeface="+mj-lt"/>
+              <a:buAutoNum type="arabicPeriod"/>
+            </a:pPr>
+            <a:r>
+              <a:rPr lang="es-ES" dirty="0"/>
+              <a:t>PL/SQL</a:t>
+            </a:r>
+          </a:p>
+        </p:txBody>
+      </p:sp>
     </p:spTree>
     <p:extLst>
       <p:ext uri="{BB962C8B-B14F-4D97-AF65-F5344CB8AC3E}">
-        <p14:creationId xmlns:p14="http://schemas.microsoft.com/office/powerpoint/2010/main" val="2996848255"/>
+        <p14:creationId xmlns:p14="http://schemas.microsoft.com/office/powerpoint/2010/main" val="3935209040"/>
       </p:ext>
     </p:extLst>
   </p:cSld>
@@ -12062,7 +12879,7 @@
           <p:cNvPr id="2" name="Título 1">
             <a:extLst>
               <a:ext uri="{FF2B5EF4-FFF2-40B4-BE49-F238E27FC236}">
-                <a16:creationId xmlns:a16="http://schemas.microsoft.com/office/drawing/2014/main" id="{1FA2B05A-7C0C-4C15-8CEC-CA557E1C4307}"/>
+                <a16:creationId xmlns:a16="http://schemas.microsoft.com/office/drawing/2014/main" id="{BC0C1C2F-5E80-4031-9A91-1BC95CCB7B8A}"/>
               </a:ext>
             </a:extLst>
           </p:cNvPr>
@@ -12075,8 +12892,8 @@
         </p:nvSpPr>
         <p:spPr>
           <a:xfrm>
-            <a:off x="0" y="0"/>
-            <a:ext cx="9295002" cy="598415"/>
+            <a:off x="81716" y="53596"/>
+            <a:ext cx="5757022" cy="598415"/>
           </a:xfrm>
         </p:spPr>
         <p:txBody>
@@ -12087,81 +12904,124 @@
           <a:p>
             <a:r>
               <a:rPr lang="es-ES" dirty="0"/>
-              <a:t>Imprimir la tabla de multiplicar de un número</a:t>
-            </a:r>
-          </a:p>
-        </p:txBody>
-      </p:sp>
-      <p:sp>
-        <p:nvSpPr>
-          <p:cNvPr id="5" name="Diagrama de flujo: documento 4">
+              <a:t>¿Qué hace este programa</a:t>
+            </a:r>
+          </a:p>
+        </p:txBody>
+      </p:sp>
+      <p:pic>
+        <p:nvPicPr>
+          <p:cNvPr id="5" name="Imagen 4">
             <a:extLst>
               <a:ext uri="{FF2B5EF4-FFF2-40B4-BE49-F238E27FC236}">
-                <a16:creationId xmlns:a16="http://schemas.microsoft.com/office/drawing/2014/main" id="{68311E47-A87A-4224-84FE-F944E6D901FE}"/>
+                <a16:creationId xmlns:a16="http://schemas.microsoft.com/office/drawing/2014/main" id="{778961C3-6ED2-49D3-86B8-06827C0C648A}"/>
               </a:ext>
             </a:extLst>
           </p:cNvPr>
-          <p:cNvSpPr/>
+          <p:cNvPicPr>
+            <a:picLocks noChangeAspect="1"/>
+          </p:cNvPicPr>
           <p:nvPr/>
-        </p:nvSpPr>
+        </p:nvPicPr>
+        <p:blipFill>
+          <a:blip r:embed="rId2"/>
+          <a:stretch>
+            <a:fillRect/>
+          </a:stretch>
+        </p:blipFill>
         <p:spPr>
           <a:xfrm>
-            <a:off x="1256489" y="4724320"/>
-            <a:ext cx="2088858" cy="628552"/>
-          </a:xfrm>
-          <a:prstGeom prst="flowChartDocument">
+            <a:off x="81716" y="749883"/>
+            <a:ext cx="9914286" cy="3828571"/>
+          </a:xfrm>
+          <a:prstGeom prst="rect">
             <a:avLst/>
           </a:prstGeom>
         </p:spPr>
-        <p:style>
-          <a:lnRef idx="2">
-            <a:schemeClr val="dk1"/>
-          </a:lnRef>
-          <a:fillRef idx="1">
-            <a:schemeClr val="lt1"/>
-          </a:fillRef>
-          <a:effectRef idx="0">
-            <a:schemeClr val="dk1"/>
-          </a:effectRef>
-          <a:fontRef idx="minor">
-            <a:schemeClr val="dk1"/>
-          </a:fontRef>
-        </p:style>
-        <p:txBody>
-          <a:bodyPr rtlCol="0" anchor="ctr"/>
+      </p:pic>
+      <p:pic>
+        <p:nvPicPr>
+          <p:cNvPr id="6" name="Imagen 5">
+            <a:extLst>
+              <a:ext uri="{FF2B5EF4-FFF2-40B4-BE49-F238E27FC236}">
+                <a16:creationId xmlns:a16="http://schemas.microsoft.com/office/drawing/2014/main" id="{496AF44A-0165-437F-B456-3EBF070EF585}"/>
+              </a:ext>
+            </a:extLst>
+          </p:cNvPr>
+          <p:cNvPicPr>
+            <a:picLocks noChangeAspect="1"/>
+          </p:cNvPicPr>
+          <p:nvPr/>
+        </p:nvPicPr>
+        <p:blipFill>
+          <a:blip r:embed="rId3"/>
+          <a:stretch>
+            <a:fillRect/>
+          </a:stretch>
+        </p:blipFill>
+        <p:spPr>
+          <a:xfrm>
+            <a:off x="8258628" y="4375124"/>
+            <a:ext cx="3933372" cy="2482876"/>
+          </a:xfrm>
+          <a:prstGeom prst="rect">
+            <a:avLst/>
+          </a:prstGeom>
+        </p:spPr>
+      </p:pic>
+      <p:sp>
+        <p:nvSpPr>
+          <p:cNvPr id="7" name="CuadroTexto 6">
+            <a:extLst>
+              <a:ext uri="{FF2B5EF4-FFF2-40B4-BE49-F238E27FC236}">
+                <a16:creationId xmlns:a16="http://schemas.microsoft.com/office/drawing/2014/main" id="{B9581936-2603-4E8E-B14F-7E9C302BDF04}"/>
+              </a:ext>
+            </a:extLst>
+          </p:cNvPr>
+          <p:cNvSpPr txBox="1"/>
+          <p:nvPr/>
+        </p:nvSpPr>
+        <p:spPr>
+          <a:xfrm>
+            <a:off x="4469179" y="5989739"/>
+            <a:ext cx="2632452" cy="369332"/>
+          </a:xfrm>
+          <a:prstGeom prst="rect">
+            <a:avLst/>
+          </a:prstGeom>
+          <a:noFill/>
+        </p:spPr>
+        <p:txBody>
+          <a:bodyPr wrap="none" rtlCol="0">
+            <a:spAutoFit/>
+          </a:bodyPr>
           <a:lstStyle/>
           <a:p>
-            <a:pPr algn="ctr"/>
-            <a:r>
-              <a:rPr lang="es-ES" dirty="0" err="1"/>
-              <a:t>Print</a:t>
-            </a:r>
             <a:r>
               <a:rPr lang="es-ES" dirty="0"/>
-              <a:t> numero * i</a:t>
+              <a:t>Ejecución del programa</a:t>
             </a:r>
           </a:p>
         </p:txBody>
       </p:sp>
       <p:cxnSp>
         <p:nvCxnSpPr>
-          <p:cNvPr id="6" name="Conector recto de flecha 5">
+          <p:cNvPr id="9" name="Conector recto de flecha 8">
             <a:extLst>
               <a:ext uri="{FF2B5EF4-FFF2-40B4-BE49-F238E27FC236}">
-                <a16:creationId xmlns:a16="http://schemas.microsoft.com/office/drawing/2014/main" id="{CF6442B0-FAA3-4EEB-8C4A-8BC2071A5CD8}"/>
+                <a16:creationId xmlns:a16="http://schemas.microsoft.com/office/drawing/2014/main" id="{87BF4D44-8A9F-4ACC-AFF3-E5E4B12711F3}"/>
               </a:ext>
             </a:extLst>
           </p:cNvPr>
           <p:cNvCxnSpPr>
             <a:cxnSpLocks/>
-            <a:stCxn id="23" idx="2"/>
           </p:cNvCxnSpPr>
           <p:nvPr/>
         </p:nvCxnSpPr>
         <p:spPr>
-          <a:xfrm flipH="1">
-            <a:off x="2300919" y="2603714"/>
-            <a:ext cx="23396" cy="638591"/>
+          <a:xfrm flipV="1">
+            <a:off x="6979640" y="5746460"/>
+            <a:ext cx="947956" cy="268446"/>
           </a:xfrm>
           <a:prstGeom prst="straightConnector1">
             <a:avLst/>
@@ -12185,24 +13045,70 @@
           </a:fontRef>
         </p:style>
       </p:cxnSp>
-      <p:cxnSp>
-        <p:nvCxnSpPr>
-          <p:cNvPr id="7" name="Conector recto de flecha 6">
+      <p:sp>
+        <p:nvSpPr>
+          <p:cNvPr id="11" name="CuadroTexto 10">
             <a:extLst>
               <a:ext uri="{FF2B5EF4-FFF2-40B4-BE49-F238E27FC236}">
-                <a16:creationId xmlns:a16="http://schemas.microsoft.com/office/drawing/2014/main" id="{67D000BC-E4E2-404D-A901-B1D7DE277867}"/>
+                <a16:creationId xmlns:a16="http://schemas.microsoft.com/office/drawing/2014/main" id="{6B9A8F25-A13C-46E7-A9B5-5A6785A98B06}"/>
               </a:ext>
             </a:extLst>
           </p:cNvPr>
-          <p:cNvCxnSpPr>
-            <a:cxnSpLocks/>
-          </p:cNvCxnSpPr>
+          <p:cNvSpPr txBox="1"/>
+          <p:nvPr/>
+        </p:nvSpPr>
+        <p:spPr>
+          <a:xfrm>
+            <a:off x="6727971" y="1887524"/>
+            <a:ext cx="747320" cy="369332"/>
+          </a:xfrm>
+          <a:prstGeom prst="rect">
+            <a:avLst/>
+          </a:prstGeom>
+        </p:spPr>
+        <p:style>
+          <a:lnRef idx="2">
+            <a:schemeClr val="dk1"/>
+          </a:lnRef>
+          <a:fillRef idx="1">
+            <a:schemeClr val="lt1"/>
+          </a:fillRef>
+          <a:effectRef idx="0">
+            <a:schemeClr val="dk1"/>
+          </a:effectRef>
+          <a:fontRef idx="minor">
+            <a:schemeClr val="dk1"/>
+          </a:fontRef>
+        </p:style>
+        <p:txBody>
+          <a:bodyPr wrap="none" rtlCol="0">
+            <a:spAutoFit/>
+          </a:bodyPr>
+          <a:lstStyle/>
+          <a:p>
+            <a:r>
+              <a:rPr lang="es-ES" dirty="0"/>
+              <a:t>bucle</a:t>
+            </a:r>
+          </a:p>
+        </p:txBody>
+      </p:sp>
+      <p:cxnSp>
+        <p:nvCxnSpPr>
+          <p:cNvPr id="13" name="Conector recto de flecha 12">
+            <a:extLst>
+              <a:ext uri="{FF2B5EF4-FFF2-40B4-BE49-F238E27FC236}">
+                <a16:creationId xmlns:a16="http://schemas.microsoft.com/office/drawing/2014/main" id="{B7320C04-97B1-4507-86C3-716227F40BB4}"/>
+              </a:ext>
+            </a:extLst>
+          </p:cNvPr>
+          <p:cNvCxnSpPr/>
           <p:nvPr/>
         </p:nvCxnSpPr>
         <p:spPr>
           <a:xfrm flipH="1">
-            <a:off x="2300915" y="4210494"/>
-            <a:ext cx="1" cy="513826"/>
+            <a:off x="4689446" y="2063692"/>
+            <a:ext cx="1812022" cy="0"/>
           </a:xfrm>
           <a:prstGeom prst="straightConnector1">
             <a:avLst/>
@@ -12226,12 +13132,60 @@
           </a:fontRef>
         </p:style>
       </p:cxnSp>
+      <p:sp>
+        <p:nvSpPr>
+          <p:cNvPr id="15" name="CuadroTexto 14">
+            <a:extLst>
+              <a:ext uri="{FF2B5EF4-FFF2-40B4-BE49-F238E27FC236}">
+                <a16:creationId xmlns:a16="http://schemas.microsoft.com/office/drawing/2014/main" id="{F240794B-3123-400C-8416-E0075EB7B856}"/>
+              </a:ext>
+            </a:extLst>
+          </p:cNvPr>
+          <p:cNvSpPr txBox="1"/>
+          <p:nvPr/>
+        </p:nvSpPr>
+        <p:spPr>
+          <a:xfrm>
+            <a:off x="7884968" y="2258702"/>
+            <a:ext cx="1172116" cy="369332"/>
+          </a:xfrm>
+          <a:prstGeom prst="rect">
+            <a:avLst/>
+          </a:prstGeom>
+        </p:spPr>
+        <p:style>
+          <a:lnRef idx="2">
+            <a:schemeClr val="dk1"/>
+          </a:lnRef>
+          <a:fillRef idx="1">
+            <a:schemeClr val="lt1"/>
+          </a:fillRef>
+          <a:effectRef idx="0">
+            <a:schemeClr val="dk1"/>
+          </a:effectRef>
+          <a:fontRef idx="minor">
+            <a:schemeClr val="dk1"/>
+          </a:fontRef>
+        </p:style>
+        <p:txBody>
+          <a:bodyPr wrap="none" rtlCol="0">
+            <a:spAutoFit/>
+          </a:bodyPr>
+          <a:lstStyle/>
+          <a:p>
+            <a:r>
+              <a:rPr lang="es-ES" dirty="0"/>
+              <a:t>condición</a:t>
+            </a:r>
+          </a:p>
+        </p:txBody>
+      </p:sp>
       <p:cxnSp>
         <p:nvCxnSpPr>
-          <p:cNvPr id="8" name="Conector recto de flecha 7">
+          <p:cNvPr id="17" name="Conector recto de flecha 16">
             <a:extLst>
               <a:ext uri="{FF2B5EF4-FFF2-40B4-BE49-F238E27FC236}">
-                <a16:creationId xmlns:a16="http://schemas.microsoft.com/office/drawing/2014/main" id="{DF1584A5-F8C4-42A1-9572-63228D2A1F9C}"/>
+                <a16:creationId xmlns:a16="http://schemas.microsoft.com/office/drawing/2014/main" id="{363AAAD0-8146-4AB6-A09E-F9F49C6C21CC}"/>
               </a:ext>
             </a:extLst>
           </p:cNvPr>
@@ -12241,9 +13195,9 @@
           <p:nvPr/>
         </p:nvCxnSpPr>
         <p:spPr>
-          <a:xfrm>
-            <a:off x="2300914" y="1828328"/>
-            <a:ext cx="5" cy="207477"/>
+          <a:xfrm flipH="1">
+            <a:off x="4689446" y="2482876"/>
+            <a:ext cx="3137482" cy="0"/>
           </a:xfrm>
           <a:prstGeom prst="straightConnector1">
             <a:avLst/>
@@ -12269,22 +13223,22 @@
       </p:cxnSp>
       <p:sp>
         <p:nvSpPr>
-          <p:cNvPr id="10" name="Diagrama de flujo: decisión 9">
+          <p:cNvPr id="20" name="CuadroTexto 19">
             <a:extLst>
               <a:ext uri="{FF2B5EF4-FFF2-40B4-BE49-F238E27FC236}">
-                <a16:creationId xmlns:a16="http://schemas.microsoft.com/office/drawing/2014/main" id="{B442817B-AC6A-4EC4-845B-D117D70E7684}"/>
+                <a16:creationId xmlns:a16="http://schemas.microsoft.com/office/drawing/2014/main" id="{E676CFF7-2AA6-47A3-BBB9-8C9A26DE026F}"/>
               </a:ext>
             </a:extLst>
           </p:cNvPr>
-          <p:cNvSpPr/>
+          <p:cNvSpPr txBox="1"/>
           <p:nvPr/>
         </p:nvSpPr>
         <p:spPr>
           <a:xfrm>
-            <a:off x="1256489" y="2839944"/>
-            <a:ext cx="2088855" cy="1335575"/>
-          </a:xfrm>
-          <a:prstGeom prst="flowChartDecision">
+            <a:off x="7531345" y="757306"/>
+            <a:ext cx="939681" cy="369332"/>
+          </a:xfrm>
+          <a:prstGeom prst="rect">
             <a:avLst/>
           </a:prstGeom>
         </p:spPr>
@@ -12303,71 +13257,37 @@
           </a:fontRef>
         </p:style>
         <p:txBody>
-          <a:bodyPr rtlCol="0" anchor="ctr"/>
-          <a:lstStyle/>
-          <a:p>
-            <a:pPr algn="ctr"/>
-            <a:r>
-              <a:rPr lang="es-ES" dirty="0"/>
-              <a:t>I &lt;= 10</a:t>
-            </a:r>
-          </a:p>
-        </p:txBody>
-      </p:sp>
-      <p:sp>
-        <p:nvSpPr>
-          <p:cNvPr id="14" name="CuadroTexto 13">
-            <a:extLst>
-              <a:ext uri="{FF2B5EF4-FFF2-40B4-BE49-F238E27FC236}">
-                <a16:creationId xmlns:a16="http://schemas.microsoft.com/office/drawing/2014/main" id="{9145DB9C-57FD-4B52-9C1E-A449AD0651E7}"/>
-              </a:ext>
-            </a:extLst>
-          </p:cNvPr>
-          <p:cNvSpPr txBox="1"/>
-          <p:nvPr/>
-        </p:nvSpPr>
-        <p:spPr>
-          <a:xfrm>
-            <a:off x="2308084" y="4282741"/>
-            <a:ext cx="343364" cy="369332"/>
-          </a:xfrm>
-          <a:prstGeom prst="rect">
-            <a:avLst/>
-          </a:prstGeom>
-          <a:noFill/>
-        </p:spPr>
-        <p:txBody>
           <a:bodyPr wrap="none" rtlCol="0">
             <a:spAutoFit/>
           </a:bodyPr>
           <a:lstStyle/>
           <a:p>
             <a:r>
-              <a:rPr lang="es-ES" dirty="0"/>
-              <a:t>si</a:t>
-            </a:r>
+              <a:rPr lang="es-ES" dirty="0" err="1"/>
+              <a:t>libreria</a:t>
+            </a:r>
+            <a:endParaRPr lang="es-ES" dirty="0"/>
           </a:p>
         </p:txBody>
       </p:sp>
       <p:cxnSp>
         <p:nvCxnSpPr>
-          <p:cNvPr id="16" name="Conector recto de flecha 15">
+          <p:cNvPr id="22" name="Conector recto de flecha 21">
             <a:extLst>
               <a:ext uri="{FF2B5EF4-FFF2-40B4-BE49-F238E27FC236}">
-                <a16:creationId xmlns:a16="http://schemas.microsoft.com/office/drawing/2014/main" id="{9E3F010C-6F82-4F93-B6F5-CB3CEA99535D}"/>
+                <a16:creationId xmlns:a16="http://schemas.microsoft.com/office/drawing/2014/main" id="{D21812F8-02CB-486D-9C99-DD655A910BDB}"/>
               </a:ext>
             </a:extLst>
           </p:cNvPr>
           <p:cNvCxnSpPr>
             <a:cxnSpLocks/>
-            <a:stCxn id="5" idx="2"/>
           </p:cNvCxnSpPr>
           <p:nvPr/>
         </p:nvCxnSpPr>
         <p:spPr>
           <a:xfrm flipH="1">
-            <a:off x="2300915" y="5311318"/>
-            <a:ext cx="3" cy="276079"/>
+            <a:off x="3229761" y="922789"/>
+            <a:ext cx="4223857" cy="0"/>
           </a:xfrm>
           <a:prstGeom prst="straightConnector1">
             <a:avLst/>
@@ -12391,24 +13311,70 @@
           </a:fontRef>
         </p:style>
       </p:cxnSp>
-      <p:cxnSp>
-        <p:nvCxnSpPr>
-          <p:cNvPr id="18" name="Conector recto de flecha 17">
+      <p:sp>
+        <p:nvSpPr>
+          <p:cNvPr id="24" name="CuadroTexto 23">
             <a:extLst>
               <a:ext uri="{FF2B5EF4-FFF2-40B4-BE49-F238E27FC236}">
-                <a16:creationId xmlns:a16="http://schemas.microsoft.com/office/drawing/2014/main" id="{7EDB7357-713F-4FF7-A8DE-CCDF9EA081DD}"/>
+                <a16:creationId xmlns:a16="http://schemas.microsoft.com/office/drawing/2014/main" id="{FE1007B7-6125-43A3-A943-181F4E018163}"/>
               </a:ext>
             </a:extLst>
           </p:cNvPr>
-          <p:cNvCxnSpPr>
-            <a:cxnSpLocks/>
-          </p:cNvCxnSpPr>
+          <p:cNvSpPr txBox="1"/>
+          <p:nvPr/>
+        </p:nvSpPr>
+        <p:spPr>
+          <a:xfrm>
+            <a:off x="7531345" y="1159312"/>
+            <a:ext cx="2121093" cy="369332"/>
+          </a:xfrm>
+          <a:prstGeom prst="rect">
+            <a:avLst/>
+          </a:prstGeom>
+        </p:spPr>
+        <p:style>
+          <a:lnRef idx="2">
+            <a:schemeClr val="dk1"/>
+          </a:lnRef>
+          <a:fillRef idx="1">
+            <a:schemeClr val="lt1"/>
+          </a:fillRef>
+          <a:effectRef idx="0">
+            <a:schemeClr val="dk1"/>
+          </a:effectRef>
+          <a:fontRef idx="minor">
+            <a:schemeClr val="dk1"/>
+          </a:fontRef>
+        </p:style>
+        <p:txBody>
+          <a:bodyPr wrap="none" rtlCol="0">
+            <a:spAutoFit/>
+          </a:bodyPr>
+          <a:lstStyle/>
+          <a:p>
+            <a:r>
+              <a:rPr lang="es-ES" dirty="0"/>
+              <a:t>Elige entre 1 y 100</a:t>
+            </a:r>
+          </a:p>
+        </p:txBody>
+      </p:sp>
+      <p:cxnSp>
+        <p:nvCxnSpPr>
+          <p:cNvPr id="26" name="Conector recto de flecha 25">
+            <a:extLst>
+              <a:ext uri="{FF2B5EF4-FFF2-40B4-BE49-F238E27FC236}">
+                <a16:creationId xmlns:a16="http://schemas.microsoft.com/office/drawing/2014/main" id="{F3F8E349-4762-4551-97A4-5920CA005A40}"/>
+              </a:ext>
+            </a:extLst>
+          </p:cNvPr>
+          <p:cNvCxnSpPr/>
           <p:nvPr/>
         </p:nvCxnSpPr>
         <p:spPr>
           <a:xfrm flipH="1">
-            <a:off x="2300914" y="6215949"/>
-            <a:ext cx="1" cy="243574"/>
+            <a:off x="5595457" y="1314870"/>
+            <a:ext cx="1644242" cy="0"/>
           </a:xfrm>
           <a:prstGeom prst="straightConnector1">
             <a:avLst/>
@@ -12434,509 +13400,50 @@
       </p:cxnSp>
       <p:sp>
         <p:nvSpPr>
-          <p:cNvPr id="19" name="Diagrama de flujo: terminador 18">
+          <p:cNvPr id="16" name="CuadroTexto 15">
             <a:extLst>
               <a:ext uri="{FF2B5EF4-FFF2-40B4-BE49-F238E27FC236}">
-                <a16:creationId xmlns:a16="http://schemas.microsoft.com/office/drawing/2014/main" id="{069B01D8-E416-42FE-9FC7-25DF9BBE97DD}"/>
+                <a16:creationId xmlns:a16="http://schemas.microsoft.com/office/drawing/2014/main" id="{26698717-F50B-4FE9-99D1-2AF310AC3341}"/>
               </a:ext>
             </a:extLst>
           </p:cNvPr>
-          <p:cNvSpPr/>
+          <p:cNvSpPr txBox="1"/>
           <p:nvPr/>
         </p:nvSpPr>
         <p:spPr>
           <a:xfrm>
-            <a:off x="1303296" y="645231"/>
-            <a:ext cx="2088859" cy="327032"/>
-          </a:xfrm>
-          <a:prstGeom prst="flowChartTerminator">
+            <a:off x="5838738" y="182211"/>
+            <a:ext cx="1656223" cy="369332"/>
+          </a:xfrm>
+          <a:prstGeom prst="rect">
             <a:avLst/>
           </a:prstGeom>
         </p:spPr>
         <p:style>
           <a:lnRef idx="2">
-            <a:schemeClr val="dk1"/>
+            <a:schemeClr val="accent1">
+              <a:shade val="50000"/>
+            </a:schemeClr>
           </a:lnRef>
           <a:fillRef idx="1">
-            <a:schemeClr val="lt1"/>
-          </a:fillRef>
-          <a:effectRef idx="0">
-            <a:schemeClr val="dk1"/>
-          </a:effectRef>
-          <a:fontRef idx="minor">
-            <a:schemeClr val="dk1"/>
-          </a:fontRef>
-        </p:style>
-        <p:txBody>
-          <a:bodyPr rtlCol="0" anchor="ctr"/>
-          <a:lstStyle/>
-          <a:p>
-            <a:pPr algn="ctr"/>
-            <a:r>
-              <a:rPr lang="es-ES" dirty="0"/>
-              <a:t>inicio</a:t>
-            </a:r>
-          </a:p>
-        </p:txBody>
-      </p:sp>
-      <p:cxnSp>
-        <p:nvCxnSpPr>
-          <p:cNvPr id="20" name="Conector recto de flecha 19">
-            <a:extLst>
-              <a:ext uri="{FF2B5EF4-FFF2-40B4-BE49-F238E27FC236}">
-                <a16:creationId xmlns:a16="http://schemas.microsoft.com/office/drawing/2014/main" id="{EB39F551-8492-453C-BC41-B0A49C1D10C0}"/>
-              </a:ext>
-            </a:extLst>
-          </p:cNvPr>
-          <p:cNvCxnSpPr>
-            <a:cxnSpLocks/>
-          </p:cNvCxnSpPr>
-          <p:nvPr/>
-        </p:nvCxnSpPr>
-        <p:spPr>
-          <a:xfrm>
-            <a:off x="3345344" y="5901673"/>
-            <a:ext cx="0" cy="0"/>
-          </a:xfrm>
-          <a:prstGeom prst="straightConnector1">
-            <a:avLst/>
-          </a:prstGeom>
-          <a:ln>
-            <a:tailEnd type="triangle"/>
-          </a:ln>
-        </p:spPr>
-        <p:style>
-          <a:lnRef idx="1">
-            <a:schemeClr val="accent1"/>
-          </a:lnRef>
-          <a:fillRef idx="0">
             <a:schemeClr val="accent1"/>
           </a:fillRef>
           <a:effectRef idx="0">
             <a:schemeClr val="accent1"/>
           </a:effectRef>
           <a:fontRef idx="minor">
-            <a:schemeClr val="tx1"/>
+            <a:schemeClr val="lt1"/>
           </a:fontRef>
         </p:style>
-      </p:cxnSp>
-      <p:sp>
-        <p:nvSpPr>
-          <p:cNvPr id="22" name="Rectángulo: esquinas superiores, una redondeada y la otra cortada 21">
-            <a:extLst>
-              <a:ext uri="{FF2B5EF4-FFF2-40B4-BE49-F238E27FC236}">
-                <a16:creationId xmlns:a16="http://schemas.microsoft.com/office/drawing/2014/main" id="{C014D824-388D-45E5-A607-AAF4D5C97812}"/>
-              </a:ext>
-            </a:extLst>
-          </p:cNvPr>
-          <p:cNvSpPr/>
-          <p:nvPr/>
-        </p:nvSpPr>
-        <p:spPr>
-          <a:xfrm>
-            <a:off x="1303296" y="1119379"/>
-            <a:ext cx="2088859" cy="628552"/>
-          </a:xfrm>
-          <a:prstGeom prst="snipRoundRect">
-            <a:avLst/>
-          </a:prstGeom>
-        </p:spPr>
-        <p:style>
-          <a:lnRef idx="2">
-            <a:schemeClr val="dk1"/>
-          </a:lnRef>
-          <a:fillRef idx="1">
-            <a:schemeClr val="lt1"/>
-          </a:fillRef>
-          <a:effectRef idx="0">
-            <a:schemeClr val="dk1"/>
-          </a:effectRef>
-          <a:fontRef idx="minor">
-            <a:schemeClr val="dk1"/>
-          </a:fontRef>
-        </p:style>
-        <p:txBody>
-          <a:bodyPr rtlCol="0" anchor="ctr"/>
-          <a:lstStyle/>
-          <a:p>
-            <a:pPr algn="ctr"/>
-            <a:r>
-              <a:rPr lang="es-ES" dirty="0"/>
-              <a:t>numero = leer numero</a:t>
-            </a:r>
-          </a:p>
-        </p:txBody>
-      </p:sp>
-      <p:sp>
-        <p:nvSpPr>
-          <p:cNvPr id="23" name="Rectángulo 22">
-            <a:extLst>
-              <a:ext uri="{FF2B5EF4-FFF2-40B4-BE49-F238E27FC236}">
-                <a16:creationId xmlns:a16="http://schemas.microsoft.com/office/drawing/2014/main" id="{60714763-3657-46D5-BFB1-6C35FDBFEECB}"/>
-              </a:ext>
-            </a:extLst>
-          </p:cNvPr>
-          <p:cNvSpPr/>
-          <p:nvPr/>
-        </p:nvSpPr>
-        <p:spPr>
-          <a:xfrm>
-            <a:off x="1303297" y="2004774"/>
-            <a:ext cx="2042036" cy="598940"/>
-          </a:xfrm>
-          <a:prstGeom prst="rect">
-            <a:avLst/>
-          </a:prstGeom>
-        </p:spPr>
-        <p:style>
-          <a:lnRef idx="2">
-            <a:schemeClr val="dk1"/>
-          </a:lnRef>
-          <a:fillRef idx="1">
-            <a:schemeClr val="lt1"/>
-          </a:fillRef>
-          <a:effectRef idx="0">
-            <a:schemeClr val="dk1"/>
-          </a:effectRef>
-          <a:fontRef idx="minor">
-            <a:schemeClr val="dk1"/>
-          </a:fontRef>
-        </p:style>
-        <p:txBody>
-          <a:bodyPr rtlCol="0" anchor="ctr"/>
-          <a:lstStyle/>
-          <a:p>
-            <a:pPr algn="ctr"/>
-            <a:r>
-              <a:rPr lang="es-ES" dirty="0"/>
-              <a:t>I = 1</a:t>
-            </a:r>
-          </a:p>
-        </p:txBody>
-      </p:sp>
-      <p:sp>
-        <p:nvSpPr>
-          <p:cNvPr id="25" name="Rectángulo 24">
-            <a:extLst>
-              <a:ext uri="{FF2B5EF4-FFF2-40B4-BE49-F238E27FC236}">
-                <a16:creationId xmlns:a16="http://schemas.microsoft.com/office/drawing/2014/main" id="{AA7EE4DF-073A-474D-A4EE-1745F56A7F10}"/>
-              </a:ext>
-            </a:extLst>
-          </p:cNvPr>
-          <p:cNvSpPr/>
-          <p:nvPr/>
-        </p:nvSpPr>
-        <p:spPr>
-          <a:xfrm>
-            <a:off x="1256489" y="5591397"/>
-            <a:ext cx="2042036" cy="598940"/>
-          </a:xfrm>
-          <a:prstGeom prst="rect">
-            <a:avLst/>
-          </a:prstGeom>
-        </p:spPr>
-        <p:style>
-          <a:lnRef idx="2">
-            <a:schemeClr val="dk1"/>
-          </a:lnRef>
-          <a:fillRef idx="1">
-            <a:schemeClr val="lt1"/>
-          </a:fillRef>
-          <a:effectRef idx="0">
-            <a:schemeClr val="dk1"/>
-          </a:effectRef>
-          <a:fontRef idx="minor">
-            <a:schemeClr val="dk1"/>
-          </a:fontRef>
-        </p:style>
-        <p:txBody>
-          <a:bodyPr rtlCol="0" anchor="ctr"/>
-          <a:lstStyle/>
-          <a:p>
-            <a:pPr algn="ctr"/>
-            <a:r>
-              <a:rPr lang="es-ES" dirty="0"/>
-              <a:t>I = I + 1</a:t>
-            </a:r>
-          </a:p>
-        </p:txBody>
-      </p:sp>
-      <p:pic>
-        <p:nvPicPr>
-          <p:cNvPr id="26" name="Imagen 25">
-            <a:extLst>
-              <a:ext uri="{FF2B5EF4-FFF2-40B4-BE49-F238E27FC236}">
-                <a16:creationId xmlns:a16="http://schemas.microsoft.com/office/drawing/2014/main" id="{183C101D-971B-45A3-8252-0B8657CA44A0}"/>
-              </a:ext>
-            </a:extLst>
-          </p:cNvPr>
-          <p:cNvPicPr>
-            <a:picLocks noChangeAspect="1"/>
-          </p:cNvPicPr>
-          <p:nvPr/>
-        </p:nvPicPr>
-        <p:blipFill>
-          <a:blip r:embed="rId2"/>
-          <a:stretch>
-            <a:fillRect/>
-          </a:stretch>
-        </p:blipFill>
-        <p:spPr>
-          <a:xfrm>
-            <a:off x="3925333" y="730167"/>
-            <a:ext cx="7943373" cy="1098162"/>
-          </a:xfrm>
-          <a:prstGeom prst="rect">
-            <a:avLst/>
-          </a:prstGeom>
-        </p:spPr>
-      </p:pic>
-      <p:pic>
-        <p:nvPicPr>
-          <p:cNvPr id="27" name="Imagen 26">
-            <a:extLst>
-              <a:ext uri="{FF2B5EF4-FFF2-40B4-BE49-F238E27FC236}">
-                <a16:creationId xmlns:a16="http://schemas.microsoft.com/office/drawing/2014/main" id="{35EF4E91-FBF0-4E2D-8094-426E84D1F49E}"/>
-              </a:ext>
-            </a:extLst>
-          </p:cNvPr>
-          <p:cNvPicPr>
-            <a:picLocks noChangeAspect="1"/>
-          </p:cNvPicPr>
-          <p:nvPr/>
-        </p:nvPicPr>
-        <p:blipFill>
-          <a:blip r:embed="rId3"/>
-          <a:stretch>
-            <a:fillRect/>
-          </a:stretch>
-        </p:blipFill>
-        <p:spPr>
-          <a:xfrm>
-            <a:off x="3925334" y="2035805"/>
-            <a:ext cx="7962518" cy="4714933"/>
-          </a:xfrm>
-          <a:prstGeom prst="rect">
-            <a:avLst/>
-          </a:prstGeom>
-        </p:spPr>
-      </p:pic>
-      <p:cxnSp>
-        <p:nvCxnSpPr>
-          <p:cNvPr id="29" name="Conector: angular 28">
-            <a:extLst>
-              <a:ext uri="{FF2B5EF4-FFF2-40B4-BE49-F238E27FC236}">
-                <a16:creationId xmlns:a16="http://schemas.microsoft.com/office/drawing/2014/main" id="{A635003E-886A-4152-ACFA-EFF118CFFFAC}"/>
-              </a:ext>
-            </a:extLst>
-          </p:cNvPr>
-          <p:cNvCxnSpPr>
-            <a:stCxn id="25" idx="1"/>
-            <a:endCxn id="10" idx="1"/>
-          </p:cNvCxnSpPr>
-          <p:nvPr/>
-        </p:nvCxnSpPr>
-        <p:spPr>
-          <a:xfrm rot="10800000">
-            <a:off x="1256489" y="3507733"/>
-            <a:ext cx="12700" cy="2383135"/>
-          </a:xfrm>
-          <a:prstGeom prst="bentConnector3">
-            <a:avLst>
-              <a:gd name="adj1" fmla="val 1800000"/>
-            </a:avLst>
-          </a:prstGeom>
-          <a:ln>
-            <a:tailEnd type="triangle"/>
-          </a:ln>
-        </p:spPr>
-        <p:style>
-          <a:lnRef idx="1">
-            <a:schemeClr val="accent1"/>
-          </a:lnRef>
-          <a:fillRef idx="0">
-            <a:schemeClr val="accent1"/>
-          </a:fillRef>
-          <a:effectRef idx="0">
-            <a:schemeClr val="accent1"/>
-          </a:effectRef>
-          <a:fontRef idx="minor">
-            <a:schemeClr val="tx1"/>
-          </a:fontRef>
-        </p:style>
-      </p:cxnSp>
-      <p:cxnSp>
-        <p:nvCxnSpPr>
-          <p:cNvPr id="31" name="Conector: angular 30">
-            <a:extLst>
-              <a:ext uri="{FF2B5EF4-FFF2-40B4-BE49-F238E27FC236}">
-                <a16:creationId xmlns:a16="http://schemas.microsoft.com/office/drawing/2014/main" id="{7E4205F9-3897-446F-AE42-DB2A6C22B41B}"/>
-              </a:ext>
-            </a:extLst>
-          </p:cNvPr>
-          <p:cNvCxnSpPr>
-            <a:stCxn id="10" idx="3"/>
-          </p:cNvCxnSpPr>
-          <p:nvPr/>
-        </p:nvCxnSpPr>
-        <p:spPr>
-          <a:xfrm>
-            <a:off x="3345344" y="3507732"/>
-            <a:ext cx="178032" cy="2951791"/>
-          </a:xfrm>
-          <a:prstGeom prst="bentConnector2">
-            <a:avLst/>
-          </a:prstGeom>
-          <a:ln>
-            <a:tailEnd type="triangle"/>
-          </a:ln>
-        </p:spPr>
-        <p:style>
-          <a:lnRef idx="1">
-            <a:schemeClr val="accent1"/>
-          </a:lnRef>
-          <a:fillRef idx="0">
-            <a:schemeClr val="accent1"/>
-          </a:fillRef>
-          <a:effectRef idx="0">
-            <a:schemeClr val="accent1"/>
-          </a:effectRef>
-          <a:fontRef idx="minor">
-            <a:schemeClr val="tx1"/>
-          </a:fontRef>
-        </p:style>
-      </p:cxnSp>
-      <p:cxnSp>
-        <p:nvCxnSpPr>
-          <p:cNvPr id="33" name="Conector recto de flecha 32">
-            <a:extLst>
-              <a:ext uri="{FF2B5EF4-FFF2-40B4-BE49-F238E27FC236}">
-                <a16:creationId xmlns:a16="http://schemas.microsoft.com/office/drawing/2014/main" id="{DC08B29F-4A12-41AF-A135-6BFF128CCC27}"/>
-              </a:ext>
-            </a:extLst>
-          </p:cNvPr>
-          <p:cNvCxnSpPr/>
-          <p:nvPr/>
-        </p:nvCxnSpPr>
-        <p:spPr>
-          <a:xfrm flipH="1">
-            <a:off x="2293746" y="6459523"/>
-            <a:ext cx="1229167" cy="0"/>
-          </a:xfrm>
-          <a:prstGeom prst="straightConnector1">
-            <a:avLst/>
-          </a:prstGeom>
-          <a:ln>
-            <a:tailEnd type="triangle"/>
-          </a:ln>
-        </p:spPr>
-        <p:style>
-          <a:lnRef idx="1">
-            <a:schemeClr val="accent1"/>
-          </a:lnRef>
-          <a:fillRef idx="0">
-            <a:schemeClr val="accent1"/>
-          </a:fillRef>
-          <a:effectRef idx="0">
-            <a:schemeClr val="accent1"/>
-          </a:effectRef>
-          <a:fontRef idx="minor">
-            <a:schemeClr val="tx1"/>
-          </a:fontRef>
-        </p:style>
-      </p:cxnSp>
-      <p:sp>
-        <p:nvSpPr>
-          <p:cNvPr id="34" name="CuadroTexto 33">
-            <a:extLst>
-              <a:ext uri="{FF2B5EF4-FFF2-40B4-BE49-F238E27FC236}">
-                <a16:creationId xmlns:a16="http://schemas.microsoft.com/office/drawing/2014/main" id="{FE419A59-3C25-4708-9F41-DB95BF592C37}"/>
-              </a:ext>
-            </a:extLst>
-          </p:cNvPr>
-          <p:cNvSpPr txBox="1"/>
-          <p:nvPr/>
-        </p:nvSpPr>
-        <p:spPr>
-          <a:xfrm>
-            <a:off x="3345333" y="3043451"/>
-            <a:ext cx="487634" cy="369332"/>
-          </a:xfrm>
-          <a:prstGeom prst="rect">
-            <a:avLst/>
-          </a:prstGeom>
-        </p:spPr>
-        <p:style>
-          <a:lnRef idx="2">
-            <a:schemeClr val="dk1"/>
-          </a:lnRef>
-          <a:fillRef idx="1">
-            <a:schemeClr val="lt1"/>
-          </a:fillRef>
-          <a:effectRef idx="0">
-            <a:schemeClr val="dk1"/>
-          </a:effectRef>
-          <a:fontRef idx="minor">
-            <a:schemeClr val="dk1"/>
-          </a:fontRef>
-        </p:style>
-        <p:txBody>
-          <a:bodyPr wrap="none" rtlCol="0">
+        <p:txBody>
+          <a:bodyPr wrap="square" rtlCol="0">
             <a:spAutoFit/>
           </a:bodyPr>
           <a:lstStyle/>
           <a:p>
             <a:r>
               <a:rPr lang="es-ES" dirty="0"/>
-              <a:t>NO</a:t>
-            </a:r>
-          </a:p>
-        </p:txBody>
-      </p:sp>
-      <p:sp>
-        <p:nvSpPr>
-          <p:cNvPr id="36" name="CuadroTexto 35">
-            <a:extLst>
-              <a:ext uri="{FF2B5EF4-FFF2-40B4-BE49-F238E27FC236}">
-                <a16:creationId xmlns:a16="http://schemas.microsoft.com/office/drawing/2014/main" id="{43ABA4DD-BE34-4D75-94FA-803387CCAF94}"/>
-              </a:ext>
-            </a:extLst>
-          </p:cNvPr>
-          <p:cNvSpPr txBox="1"/>
-          <p:nvPr/>
-        </p:nvSpPr>
-        <p:spPr>
-          <a:xfrm>
-            <a:off x="2393271" y="4270468"/>
-            <a:ext cx="359394" cy="369332"/>
-          </a:xfrm>
-          <a:prstGeom prst="rect">
-            <a:avLst/>
-          </a:prstGeom>
-        </p:spPr>
-        <p:style>
-          <a:lnRef idx="2">
-            <a:schemeClr val="dk1"/>
-          </a:lnRef>
-          <a:fillRef idx="1">
-            <a:schemeClr val="lt1"/>
-          </a:fillRef>
-          <a:effectRef idx="0">
-            <a:schemeClr val="dk1"/>
-          </a:effectRef>
-          <a:fontRef idx="minor">
-            <a:schemeClr val="dk1"/>
-          </a:fontRef>
-        </p:style>
-        <p:txBody>
-          <a:bodyPr wrap="none" rtlCol="0">
-            <a:spAutoFit/>
-          </a:bodyPr>
-          <a:lstStyle/>
-          <a:p>
-            <a:r>
-              <a:rPr lang="es-ES" dirty="0"/>
-              <a:t>SI</a:t>
+              <a:t>04-acertar.py</a:t>
             </a:r>
           </a:p>
         </p:txBody>
@@ -12944,7 +13451,7 @@
     </p:spTree>
     <p:extLst>
       <p:ext uri="{BB962C8B-B14F-4D97-AF65-F5344CB8AC3E}">
-        <p14:creationId xmlns:p14="http://schemas.microsoft.com/office/powerpoint/2010/main" val="650898825"/>
+        <p14:creationId xmlns:p14="http://schemas.microsoft.com/office/powerpoint/2010/main" val="2996848255"/>
       </p:ext>
     </p:extLst>
   </p:cSld>

</xml_diff>